<commit_message>
modification de la presentation
</commit_message>
<xml_diff>
--- a/docs/TER.pptx
+++ b/docs/TER.pptx
@@ -5,10 +5,10 @@
     <p:sldMasterId id="2147483660" r:id="rId1"/>
   </p:sldMasterIdLst>
   <p:notesMasterIdLst>
-    <p:notesMasterId r:id="rId19"/>
+    <p:notesMasterId r:id="rId18"/>
   </p:notesMasterIdLst>
   <p:handoutMasterIdLst>
-    <p:handoutMasterId r:id="rId20"/>
+    <p:handoutMasterId r:id="rId19"/>
   </p:handoutMasterIdLst>
   <p:sldIdLst>
     <p:sldId id="256" r:id="rId2"/>
@@ -20,14 +20,13 @@
     <p:sldId id="266" r:id="rId8"/>
     <p:sldId id="271" r:id="rId9"/>
     <p:sldId id="269" r:id="rId10"/>
-    <p:sldId id="270" r:id="rId11"/>
-    <p:sldId id="272" r:id="rId12"/>
-    <p:sldId id="264" r:id="rId13"/>
-    <p:sldId id="267" r:id="rId14"/>
-    <p:sldId id="273" r:id="rId15"/>
-    <p:sldId id="274" r:id="rId16"/>
-    <p:sldId id="275" r:id="rId17"/>
-    <p:sldId id="263" r:id="rId18"/>
+    <p:sldId id="276" r:id="rId11"/>
+    <p:sldId id="264" r:id="rId12"/>
+    <p:sldId id="267" r:id="rId13"/>
+    <p:sldId id="273" r:id="rId14"/>
+    <p:sldId id="274" r:id="rId15"/>
+    <p:sldId id="275" r:id="rId16"/>
+    <p:sldId id="263" r:id="rId17"/>
   </p:sldIdLst>
   <p:sldSz cx="9144000" cy="6858000" type="screen4x3"/>
   <p:notesSz cx="6858000" cy="9144000"/>
@@ -212,7 +211,7 @@
             <a:fld id="{E87BFDE2-5D33-45EB-9390-32225B2E8CBA}" type="datetimeFigureOut">
               <a:rPr lang="fr-FR" smtClean="0"/>
               <a:pPr/>
-              <a:t>24/02/2015</a:t>
+              <a:t>25/02/2015</a:t>
             </a:fld>
             <a:endParaRPr lang="fr-FR"/>
           </a:p>
@@ -374,7 +373,7 @@
             <a:fld id="{72063E4F-4A18-463B-88F9-D61737674A47}" type="datetimeFigureOut">
               <a:rPr lang="fr-FR" smtClean="0"/>
               <a:pPr/>
-              <a:t>24/02/2015</a:t>
+              <a:t>25/02/2015</a:t>
             </a:fld>
             <a:endParaRPr lang="fr-FR"/>
           </a:p>
@@ -901,6 +900,174 @@
               <a:rPr lang="fr-FR" smtClean="0"/>
               <a:pPr/>
               <a:t>4</a:t>
+            </a:fld>
+            <a:endParaRPr lang="fr-FR"/>
+          </a:p>
+        </p:txBody>
+      </p:sp>
+    </p:spTree>
+  </p:cSld>
+  <p:clrMapOvr>
+    <a:masterClrMapping/>
+  </p:clrMapOvr>
+</p:notes>
+</file>
+
+<file path=ppt/notesSlides/notesSlide4.xml><?xml version="1.0" encoding="utf-8"?>
+<p:notes xmlns:a="http://schemas.openxmlformats.org/drawingml/2006/main" xmlns:r="http://schemas.openxmlformats.org/officeDocument/2006/relationships" xmlns:p="http://schemas.openxmlformats.org/presentationml/2006/main">
+  <p:cSld>
+    <p:spTree>
+      <p:nvGrpSpPr>
+        <p:cNvPr id="1" name=""/>
+        <p:cNvGrpSpPr/>
+        <p:nvPr/>
+      </p:nvGrpSpPr>
+      <p:grpSpPr>
+        <a:xfrm>
+          <a:off x="0" y="0"/>
+          <a:ext cx="0" cy="0"/>
+          <a:chOff x="0" y="0"/>
+          <a:chExt cx="0" cy="0"/>
+        </a:xfrm>
+      </p:grpSpPr>
+      <p:sp>
+        <p:nvSpPr>
+          <p:cNvPr id="2" name="Espace réservé de l'image des diapositives 1"/>
+          <p:cNvSpPr>
+            <a:spLocks noGrp="1" noRot="1" noChangeAspect="1"/>
+          </p:cNvSpPr>
+          <p:nvPr>
+            <p:ph type="sldImg"/>
+          </p:nvPr>
+        </p:nvSpPr>
+        <p:spPr/>
+      </p:sp>
+      <p:sp>
+        <p:nvSpPr>
+          <p:cNvPr id="3" name="Espace réservé des commentaires 2"/>
+          <p:cNvSpPr>
+            <a:spLocks noGrp="1"/>
+          </p:cNvSpPr>
+          <p:nvPr>
+            <p:ph type="body" idx="1"/>
+          </p:nvPr>
+        </p:nvSpPr>
+        <p:spPr/>
+        <p:txBody>
+          <a:bodyPr>
+            <a:normAutofit/>
+          </a:bodyPr>
+          <a:lstStyle/>
+          <a:p>
+            <a:r>
+              <a:rPr lang="fr-FR" dirty="0" smtClean="0"/>
+              <a:t>Différence de temps pour la même taille de fichier entre Lyon et Londres</a:t>
+            </a:r>
+            <a:endParaRPr lang="fr-FR" dirty="0"/>
+          </a:p>
+        </p:txBody>
+      </p:sp>
+      <p:sp>
+        <p:nvSpPr>
+          <p:cNvPr id="4" name="Espace réservé du numéro de diapositive 3"/>
+          <p:cNvSpPr>
+            <a:spLocks noGrp="1"/>
+          </p:cNvSpPr>
+          <p:nvPr>
+            <p:ph type="sldNum" sz="quarter" idx="10"/>
+          </p:nvPr>
+        </p:nvSpPr>
+        <p:spPr/>
+        <p:txBody>
+          <a:bodyPr/>
+          <a:lstStyle/>
+          <a:p>
+            <a:fld id="{D6CC4C87-8BD4-4D4D-ADB5-ED6F2034EAD5}" type="slidenum">
+              <a:rPr lang="fr-FR" smtClean="0"/>
+              <a:pPr/>
+              <a:t>10</a:t>
+            </a:fld>
+            <a:endParaRPr lang="fr-FR"/>
+          </a:p>
+        </p:txBody>
+      </p:sp>
+    </p:spTree>
+  </p:cSld>
+  <p:clrMapOvr>
+    <a:masterClrMapping/>
+  </p:clrMapOvr>
+</p:notes>
+</file>
+
+<file path=ppt/notesSlides/notesSlide5.xml><?xml version="1.0" encoding="utf-8"?>
+<p:notes xmlns:a="http://schemas.openxmlformats.org/drawingml/2006/main" xmlns:r="http://schemas.openxmlformats.org/officeDocument/2006/relationships" xmlns:p="http://schemas.openxmlformats.org/presentationml/2006/main">
+  <p:cSld>
+    <p:spTree>
+      <p:nvGrpSpPr>
+        <p:cNvPr id="1" name=""/>
+        <p:cNvGrpSpPr/>
+        <p:nvPr/>
+      </p:nvGrpSpPr>
+      <p:grpSpPr>
+        <a:xfrm>
+          <a:off x="0" y="0"/>
+          <a:ext cx="0" cy="0"/>
+          <a:chOff x="0" y="0"/>
+          <a:chExt cx="0" cy="0"/>
+        </a:xfrm>
+      </p:grpSpPr>
+      <p:sp>
+        <p:nvSpPr>
+          <p:cNvPr id="2" name="Espace réservé de l'image des diapositives 1"/>
+          <p:cNvSpPr>
+            <a:spLocks noGrp="1" noRot="1" noChangeAspect="1"/>
+          </p:cNvSpPr>
+          <p:nvPr>
+            <p:ph type="sldImg"/>
+          </p:nvPr>
+        </p:nvSpPr>
+        <p:spPr/>
+      </p:sp>
+      <p:sp>
+        <p:nvSpPr>
+          <p:cNvPr id="3" name="Espace réservé des commentaires 2"/>
+          <p:cNvSpPr>
+            <a:spLocks noGrp="1"/>
+          </p:cNvSpPr>
+          <p:nvPr>
+            <p:ph type="body" idx="1"/>
+          </p:nvPr>
+        </p:nvSpPr>
+        <p:spPr/>
+        <p:txBody>
+          <a:bodyPr>
+            <a:normAutofit/>
+          </a:bodyPr>
+          <a:lstStyle/>
+          <a:p>
+            <a:endParaRPr lang="fr-FR"/>
+          </a:p>
+        </p:txBody>
+      </p:sp>
+      <p:sp>
+        <p:nvSpPr>
+          <p:cNvPr id="4" name="Espace réservé du numéro de diapositive 3"/>
+          <p:cNvSpPr>
+            <a:spLocks noGrp="1"/>
+          </p:cNvSpPr>
+          <p:nvPr>
+            <p:ph type="sldNum" sz="quarter" idx="10"/>
+          </p:nvPr>
+        </p:nvSpPr>
+        <p:spPr/>
+        <p:txBody>
+          <a:bodyPr/>
+          <a:lstStyle/>
+          <a:p>
+            <a:fld id="{D6CC4C87-8BD4-4D4D-ADB5-ED6F2034EAD5}" type="slidenum">
+              <a:rPr lang="fr-FR" smtClean="0"/>
+              <a:pPr/>
+              <a:t>11</a:t>
             </a:fld>
             <a:endParaRPr lang="fr-FR"/>
           </a:p>
@@ -1540,7 +1707,7 @@
             <a:fld id="{99048350-1B02-48C4-A98A-3D7A872AF1D1}" type="datetime1">
               <a:rPr lang="fr-FR" smtClean="0"/>
               <a:pPr/>
-              <a:t>24/02/2015</a:t>
+              <a:t>25/02/2015</a:t>
             </a:fld>
             <a:endParaRPr lang="fr-FR"/>
           </a:p>
@@ -1738,7 +1905,7 @@
             <a:fld id="{ED96D579-57A8-4A41-A842-9926A6D73BE1}" type="datetime1">
               <a:rPr lang="fr-FR" smtClean="0"/>
               <a:pPr/>
-              <a:t>24/02/2015</a:t>
+              <a:t>25/02/2015</a:t>
             </a:fld>
             <a:endParaRPr lang="fr-FR"/>
           </a:p>
@@ -1925,7 +2092,7 @@
             <a:fld id="{288D761B-1F2C-4D56-81FC-28F945B92715}" type="datetime1">
               <a:rPr lang="fr-FR" smtClean="0"/>
               <a:pPr/>
-              <a:t>24/02/2015</a:t>
+              <a:t>25/02/2015</a:t>
             </a:fld>
             <a:endParaRPr lang="fr-FR"/>
           </a:p>
@@ -2077,7 +2244,7 @@
             <a:fld id="{39DA2AF2-0C83-41E7-B696-3923B2502827}" type="datetime1">
               <a:rPr lang="fr-FR" smtClean="0"/>
               <a:pPr/>
-              <a:t>24/02/2015</a:t>
+              <a:t>25/02/2015</a:t>
             </a:fld>
             <a:endParaRPr lang="fr-FR"/>
           </a:p>
@@ -2334,7 +2501,7 @@
             <a:fld id="{4D34A6BE-FCB7-49C4-BDCB-E77C944E14B9}" type="datetime1">
               <a:rPr lang="fr-FR" smtClean="0"/>
               <a:pPr/>
-              <a:t>24/02/2015</a:t>
+              <a:t>25/02/2015</a:t>
             </a:fld>
             <a:endParaRPr lang="fr-FR"/>
           </a:p>
@@ -2745,7 +2912,7 @@
             <a:fld id="{F4524890-ECC2-4BF2-9043-451E7FECC140}" type="datetime1">
               <a:rPr lang="fr-FR" smtClean="0"/>
               <a:pPr/>
-              <a:t>24/02/2015</a:t>
+              <a:t>25/02/2015</a:t>
             </a:fld>
             <a:endParaRPr lang="fr-FR"/>
           </a:p>
@@ -3193,7 +3360,7 @@
             <a:fld id="{40D1A748-EB92-4FC1-A495-3CCEC12F7A31}" type="datetime1">
               <a:rPr lang="fr-FR" smtClean="0"/>
               <a:pPr/>
-              <a:t>24/02/2015</a:t>
+              <a:t>25/02/2015</a:t>
             </a:fld>
             <a:endParaRPr lang="fr-FR"/>
           </a:p>
@@ -3296,7 +3463,7 @@
             <a:fld id="{0C141721-0F61-4D00-BAF3-51B2068434DA}" type="datetime1">
               <a:rPr lang="fr-FR" smtClean="0"/>
               <a:pPr/>
-              <a:t>24/02/2015</a:t>
+              <a:t>25/02/2015</a:t>
             </a:fld>
             <a:endParaRPr lang="fr-FR"/>
           </a:p>
@@ -3419,7 +3586,7 @@
             <a:fld id="{1BB9892A-00B0-4581-9A7F-F45CB9E5A018}" type="datetime1">
               <a:rPr lang="fr-FR" smtClean="0"/>
               <a:pPr/>
-              <a:t>24/02/2015</a:t>
+              <a:t>25/02/2015</a:t>
             </a:fld>
             <a:endParaRPr lang="fr-FR"/>
           </a:p>
@@ -3695,7 +3862,7 @@
             <a:fld id="{67AACC24-B37A-4D09-9CDF-FDE56DD7997B}" type="datetime1">
               <a:rPr lang="fr-FR" smtClean="0"/>
               <a:pPr/>
-              <a:t>24/02/2015</a:t>
+              <a:t>25/02/2015</a:t>
             </a:fld>
             <a:endParaRPr lang="fr-FR"/>
           </a:p>
@@ -3902,7 +4069,7 @@
             <a:fld id="{B1704885-383D-47AC-BAE4-A432D9508D81}" type="datetime1">
               <a:rPr lang="fr-FR" smtClean="0"/>
               <a:pPr/>
-              <a:t>24/02/2015</a:t>
+              <a:t>25/02/2015</a:t>
             </a:fld>
             <a:endParaRPr lang="fr-FR"/>
           </a:p>
@@ -5013,7 +5180,7 @@
             <a:fld id="{D3BAC3D6-7914-4F7A-9FA2-FD590B71F5F3}" type="datetime1">
               <a:rPr lang="fr-FR" smtClean="0"/>
               <a:pPr/>
-              <a:t>24/02/2015</a:t>
+              <a:t>25/02/2015</a:t>
             </a:fld>
             <a:endParaRPr lang="fr-FR"/>
           </a:p>
@@ -5467,59 +5634,115 @@
         </p:nvSpPr>
         <p:spPr/>
         <p:txBody>
+          <a:bodyPr>
+            <a:normAutofit lnSpcReduction="10000"/>
+          </a:bodyPr>
+          <a:lstStyle/>
+          <a:p>
+            <a:r>
+              <a:rPr lang="fr-FR" dirty="0" smtClean="0"/>
+              <a:t>Antoine Martin &amp; Carole Bonfré</a:t>
+            </a:r>
+          </a:p>
+          <a:p>
+            <a:r>
+              <a:rPr lang="fr-FR" sz="2000" dirty="0" err="1" smtClean="0"/>
+              <a:t>Encadrants</a:t>
+            </a:r>
+            <a:r>
+              <a:rPr lang="fr-FR" sz="2000" dirty="0" smtClean="0"/>
+              <a:t> : Yves </a:t>
+            </a:r>
+            <a:r>
+              <a:rPr lang="fr-FR" sz="2000" dirty="0" err="1" smtClean="0"/>
+              <a:t>Caniou</a:t>
+            </a:r>
+            <a:r>
+              <a:rPr lang="fr-FR" sz="2000" dirty="0" smtClean="0"/>
+              <a:t> &amp; Eddy Caron</a:t>
+            </a:r>
+          </a:p>
+          <a:p>
+            <a:r>
+              <a:rPr lang="fr-FR" sz="2000" dirty="0" smtClean="0"/>
+              <a:t>27/02/2015</a:t>
+            </a:r>
+            <a:endParaRPr lang="fr-FR" sz="2000" dirty="0"/>
+          </a:p>
+        </p:txBody>
+      </p:sp>
+      <p:sp>
+        <p:nvSpPr>
+          <p:cNvPr id="4" name="Espace réservé du numéro de diapositive 3"/>
+          <p:cNvSpPr>
+            <a:spLocks noGrp="1"/>
+          </p:cNvSpPr>
+          <p:nvPr>
+            <p:ph type="sldNum" sz="quarter" idx="12"/>
+          </p:nvPr>
+        </p:nvSpPr>
+        <p:spPr/>
+        <p:txBody>
           <a:bodyPr/>
           <a:lstStyle/>
           <a:p>
-            <a:r>
-              <a:rPr lang="fr-FR" dirty="0" smtClean="0"/>
-              <a:t>Antoine Martin &amp; Carole Bonfré</a:t>
-            </a:r>
-          </a:p>
-          <a:p>
-            <a:r>
-              <a:rPr lang="fr-FR" sz="2000" dirty="0" err="1" smtClean="0"/>
-              <a:t>Encadrants</a:t>
-            </a:r>
-            <a:r>
-              <a:rPr lang="fr-FR" sz="2000" dirty="0" smtClean="0"/>
-              <a:t> : Yves </a:t>
-            </a:r>
-            <a:r>
-              <a:rPr lang="fr-FR" sz="2000" dirty="0" err="1" smtClean="0"/>
-              <a:t>Caniou</a:t>
-            </a:r>
-            <a:r>
-              <a:rPr lang="fr-FR" sz="2000" dirty="0" smtClean="0"/>
-              <a:t> &amp; Eddy Caron</a:t>
-            </a:r>
-            <a:endParaRPr lang="fr-FR" sz="2000" dirty="0"/>
-          </a:p>
-        </p:txBody>
-      </p:sp>
-      <p:sp>
-        <p:nvSpPr>
-          <p:cNvPr id="4" name="Espace réservé du numéro de diapositive 3"/>
-          <p:cNvSpPr>
-            <a:spLocks noGrp="1"/>
-          </p:cNvSpPr>
-          <p:nvPr>
-            <p:ph type="sldNum" sz="quarter" idx="12"/>
-          </p:nvPr>
-        </p:nvSpPr>
-        <p:spPr/>
-        <p:txBody>
-          <a:bodyPr/>
-          <a:lstStyle/>
-          <a:p>
             <a:fld id="{BCF39854-5727-49C5-871A-2A9A28C6ADE3}" type="slidenum">
-              <a:rPr lang="fr-FR" smtClean="0"/>
+              <a:rPr lang="fr-FR" sz="1600" smtClean="0"/>
               <a:pPr/>
               <a:t>1</a:t>
             </a:fld>
-            <a:endParaRPr lang="fr-FR"/>
-          </a:p>
-        </p:txBody>
-      </p:sp>
+            <a:endParaRPr lang="fr-FR" sz="1600" dirty="0"/>
+          </a:p>
+        </p:txBody>
+      </p:sp>
+      <p:pic>
+        <p:nvPicPr>
+          <p:cNvPr id="5" name="Image 4" descr="logo-lyon1.png"/>
+          <p:cNvPicPr>
+            <a:picLocks noChangeAspect="1"/>
+          </p:cNvPicPr>
+          <p:nvPr/>
+        </p:nvPicPr>
+        <p:blipFill>
+          <a:blip r:embed="rId2" cstate="print"/>
+          <a:stretch>
+            <a:fillRect/>
+          </a:stretch>
+        </p:blipFill>
+        <p:spPr>
+          <a:xfrm>
+            <a:off x="102146" y="4365104"/>
+            <a:ext cx="2309614" cy="609129"/>
+          </a:xfrm>
+          <a:prstGeom prst="rect">
+            <a:avLst/>
+          </a:prstGeom>
+        </p:spPr>
+      </p:pic>
+      <p:pic>
+        <p:nvPicPr>
+          <p:cNvPr id="6" name="Image 5" descr="logo-ens.png"/>
+          <p:cNvPicPr>
+            <a:picLocks noChangeAspect="1"/>
+          </p:cNvPicPr>
+          <p:nvPr/>
+        </p:nvPicPr>
+        <p:blipFill>
+          <a:blip r:embed="rId3" cstate="print"/>
+          <a:stretch>
+            <a:fillRect/>
+          </a:stretch>
+        </p:blipFill>
+        <p:spPr>
+          <a:xfrm>
+            <a:off x="144016" y="3643276"/>
+            <a:ext cx="1547664" cy="577812"/>
+          </a:xfrm>
+          <a:prstGeom prst="rect">
+            <a:avLst/>
+          </a:prstGeom>
+        </p:spPr>
+      </p:pic>
     </p:spTree>
   </p:cSld>
   <p:clrMapOvr>
@@ -5571,56 +5794,62 @@
               <a:buNone/>
             </a:pPr>
             <a:r>
-              <a:rPr lang="fr-FR" dirty="0" smtClean="0"/>
-              <a:t>Londres </a:t>
+              <a:rPr lang="fr-FR" b="1" dirty="0" smtClean="0"/>
+              <a:t>Download</a:t>
             </a:r>
           </a:p>
           <a:p>
             <a:pPr>
               <a:buNone/>
             </a:pPr>
+            <a:endParaRPr lang="fr-FR" b="1" dirty="0" smtClean="0"/>
+          </a:p>
+          <a:p>
             <a:r>
               <a:rPr lang="fr-FR" dirty="0" smtClean="0"/>
-              <a:t>dimanche</a:t>
+              <a:t>La </a:t>
+            </a:r>
+            <a:r>
+              <a:rPr lang="fr-FR" dirty="0" err="1" smtClean="0"/>
+              <a:t>Doua</a:t>
+            </a:r>
+            <a:r>
+              <a:rPr lang="fr-FR" dirty="0" smtClean="0"/>
+              <a:t> </a:t>
             </a:r>
           </a:p>
           <a:p>
             <a:pPr>
               <a:buNone/>
             </a:pPr>
+            <a:r>
+              <a:rPr lang="fr-FR" dirty="0" smtClean="0"/>
+              <a:t>  Lyon 1</a:t>
+            </a:r>
+          </a:p>
+          <a:p>
             <a:endParaRPr lang="fr-FR" dirty="0" smtClean="0"/>
           </a:p>
           <a:p>
+            <a:endParaRPr lang="fr-FR" dirty="0" smtClean="0"/>
+          </a:p>
+          <a:p>
+            <a:endParaRPr lang="fr-FR" dirty="0" smtClean="0"/>
+          </a:p>
+          <a:p>
             <a:r>
               <a:rPr lang="fr-FR" dirty="0" smtClean="0"/>
-              <a:t>Upload</a:t>
-            </a:r>
-          </a:p>
-          <a:p>
-            <a:endParaRPr lang="fr-FR" dirty="0" smtClean="0"/>
-          </a:p>
-          <a:p>
-            <a:endParaRPr lang="fr-FR" dirty="0" smtClean="0"/>
-          </a:p>
-          <a:p>
-            <a:endParaRPr lang="fr-FR" dirty="0" smtClean="0"/>
-          </a:p>
-          <a:p>
-            <a:r>
-              <a:rPr lang="fr-FR" dirty="0" smtClean="0"/>
-              <a:t>Download</a:t>
+              <a:t>Londres</a:t>
             </a:r>
           </a:p>
           <a:p>
             <a:pPr>
               <a:buNone/>
             </a:pPr>
-            <a:endParaRPr lang="fr-FR" dirty="0" smtClean="0"/>
-          </a:p>
-          <a:p>
-            <a:pPr>
-              <a:buNone/>
-            </a:pPr>
+            <a:r>
+              <a:rPr lang="fr-FR" dirty="0" smtClean="0"/>
+              <a:t>  10Mo</a:t>
+            </a:r>
             <a:endParaRPr lang="fr-FR" dirty="0"/>
           </a:p>
         </p:txBody>
@@ -5644,7 +5873,7 @@
           <a:p>
             <a:r>
               <a:rPr lang="fr-FR" dirty="0" smtClean="0"/>
-              <a:t>III - Analyse</a:t>
+              <a:t>Analyse</a:t>
             </a:r>
             <a:endParaRPr lang="fr-FR" dirty="0"/>
           </a:p>
@@ -5660,78 +5889,35 @@
             <p:ph type="sldNum" sz="quarter" idx="12"/>
           </p:nvPr>
         </p:nvSpPr>
-        <p:spPr/>
+        <p:spPr>
+          <a:xfrm>
+            <a:off x="8532440" y="6407944"/>
+            <a:ext cx="480592" cy="365125"/>
+          </a:xfrm>
+        </p:spPr>
         <p:txBody>
           <a:bodyPr/>
           <a:lstStyle/>
           <a:p>
             <a:fld id="{BCF39854-5727-49C5-871A-2A9A28C6ADE3}" type="slidenum">
-              <a:rPr lang="fr-FR" smtClean="0"/>
+              <a:rPr lang="fr-FR" sz="1600" smtClean="0"/>
               <a:pPr/>
               <a:t>10</a:t>
             </a:fld>
-            <a:endParaRPr lang="fr-FR"/>
+            <a:endParaRPr lang="fr-FR" sz="1600"/>
           </a:p>
         </p:txBody>
       </p:sp>
       <p:pic>
         <p:nvPicPr>
-          <p:cNvPr id="6" name="Image 5" descr="logo-ens.png"/>
-          <p:cNvPicPr>
-            <a:picLocks noChangeAspect="1"/>
-          </p:cNvPicPr>
-          <p:nvPr/>
-        </p:nvPicPr>
-        <p:blipFill>
-          <a:blip r:embed="rId2" cstate="print"/>
-          <a:stretch>
-            <a:fillRect/>
-          </a:stretch>
-        </p:blipFill>
-        <p:spPr>
-          <a:xfrm>
-            <a:off x="7236296" y="188640"/>
-            <a:ext cx="1547664" cy="577812"/>
-          </a:xfrm>
-          <a:prstGeom prst="rect">
-            <a:avLst/>
-          </a:prstGeom>
-        </p:spPr>
-      </p:pic>
-      <p:pic>
-        <p:nvPicPr>
-          <p:cNvPr id="7" name="Image 6" descr="logo-lyon1.png"/>
-          <p:cNvPicPr>
-            <a:picLocks noChangeAspect="1"/>
-          </p:cNvPicPr>
-          <p:nvPr/>
-        </p:nvPicPr>
-        <p:blipFill>
-          <a:blip r:embed="rId3" cstate="print"/>
-          <a:stretch>
-            <a:fillRect/>
-          </a:stretch>
-        </p:blipFill>
-        <p:spPr>
-          <a:xfrm>
-            <a:off x="4572000" y="116632"/>
-            <a:ext cx="2309614" cy="609129"/>
-          </a:xfrm>
-          <a:prstGeom prst="rect">
-            <a:avLst/>
-          </a:prstGeom>
-        </p:spPr>
-      </p:pic>
-      <p:pic>
-        <p:nvPicPr>
-          <p:cNvPr id="3074" name="Picture 2"/>
+          <p:cNvPr id="1026" name="Picture 2"/>
           <p:cNvPicPr>
             <a:picLocks noChangeAspect="1" noChangeArrowheads="1"/>
           </p:cNvPicPr>
           <p:nvPr/>
         </p:nvPicPr>
         <p:blipFill>
-          <a:blip r:embed="rId4" cstate="print"/>
+          <a:blip r:embed="rId3" cstate="print"/>
           <a:srcRect/>
           <a:stretch>
             <a:fillRect/>
@@ -5739,8 +5925,8 @@
         </p:blipFill>
         <p:spPr bwMode="auto">
           <a:xfrm>
-            <a:off x="3185436" y="1412776"/>
-            <a:ext cx="5958564" cy="2509591"/>
+            <a:off x="2654944" y="1340768"/>
+            <a:ext cx="6489056" cy="2475745"/>
           </a:xfrm>
           <a:prstGeom prst="rect">
             <a:avLst/>
@@ -5756,14 +5942,14 @@
       </p:pic>
       <p:pic>
         <p:nvPicPr>
-          <p:cNvPr id="3075" name="Picture 3"/>
+          <p:cNvPr id="7" name="Picture 3"/>
           <p:cNvPicPr>
             <a:picLocks noChangeAspect="1" noChangeArrowheads="1"/>
           </p:cNvPicPr>
           <p:nvPr/>
         </p:nvPicPr>
         <p:blipFill>
-          <a:blip r:embed="rId5" cstate="print"/>
+          <a:blip r:embed="rId4" cstate="print"/>
           <a:srcRect/>
           <a:stretch>
             <a:fillRect/>
@@ -5771,8 +5957,8 @@
         </p:blipFill>
         <p:spPr bwMode="auto">
           <a:xfrm>
-            <a:off x="3212701" y="4005064"/>
-            <a:ext cx="5931299" cy="2502657"/>
+            <a:off x="2627784" y="3861048"/>
+            <a:ext cx="6516216" cy="2486106"/>
           </a:xfrm>
           <a:prstGeom prst="rect">
             <a:avLst/>
@@ -5837,8 +6023,8 @@
               <a:buNone/>
             </a:pPr>
             <a:r>
-              <a:rPr lang="fr-FR" dirty="0" smtClean="0"/>
-              <a:t>Londres lundi</a:t>
+              <a:rPr lang="fr-FR" b="1" dirty="0" smtClean="0"/>
+              <a:t>Bilan professionnel</a:t>
             </a:r>
           </a:p>
           <a:p>
@@ -5850,34 +6036,26 @@
           <a:p>
             <a:r>
               <a:rPr lang="fr-FR" dirty="0" smtClean="0"/>
-              <a:t>Upload</a:t>
+              <a:t>Le projet</a:t>
             </a:r>
           </a:p>
           <a:p>
             <a:endParaRPr lang="fr-FR" dirty="0" smtClean="0"/>
           </a:p>
           <a:p>
+            <a:r>
+              <a:rPr lang="fr-FR" dirty="0" smtClean="0"/>
+              <a:t>L’objectif</a:t>
+            </a:r>
+          </a:p>
+          <a:p>
             <a:endParaRPr lang="fr-FR" dirty="0" smtClean="0"/>
           </a:p>
           <a:p>
-            <a:endParaRPr lang="fr-FR" dirty="0" smtClean="0"/>
-          </a:p>
-          <a:p>
             <a:r>
               <a:rPr lang="fr-FR" dirty="0" smtClean="0"/>
-              <a:t>Download</a:t>
-            </a:r>
-          </a:p>
-          <a:p>
-            <a:pPr>
-              <a:buNone/>
-            </a:pPr>
-            <a:endParaRPr lang="fr-FR" dirty="0" smtClean="0"/>
-          </a:p>
-          <a:p>
-            <a:pPr>
-              <a:buNone/>
-            </a:pPr>
+              <a:t>Les contraintes</a:t>
+            </a:r>
             <a:endParaRPr lang="fr-FR" dirty="0"/>
           </a:p>
         </p:txBody>
@@ -5890,31 +6068,6 @@
           </p:cNvSpPr>
           <p:nvPr>
             <p:ph type="title"/>
-          </p:nvPr>
-        </p:nvSpPr>
-        <p:spPr/>
-        <p:txBody>
-          <a:bodyPr>
-            <a:normAutofit/>
-          </a:bodyPr>
-          <a:lstStyle/>
-          <a:p>
-            <a:r>
-              <a:rPr lang="fr-FR" dirty="0" smtClean="0"/>
-              <a:t>III - Analyse</a:t>
-            </a:r>
-            <a:endParaRPr lang="fr-FR" dirty="0"/>
-          </a:p>
-        </p:txBody>
-      </p:sp>
-      <p:sp>
-        <p:nvSpPr>
-          <p:cNvPr id="4" name="Espace réservé du numéro de diapositive 3"/>
-          <p:cNvSpPr>
-            <a:spLocks noGrp="1"/>
-          </p:cNvSpPr>
-          <p:nvPr>
-            <p:ph type="sldNum" sz="quarter" idx="12"/>
           </p:nvPr>
         </p:nvSpPr>
         <p:spPr/>
@@ -5922,73 +6075,53 @@
           <a:bodyPr/>
           <a:lstStyle/>
           <a:p>
+            <a:r>
+              <a:rPr lang="fr-FR" dirty="0" smtClean="0"/>
+              <a:t>Bilan</a:t>
+            </a:r>
+            <a:endParaRPr lang="fr-FR" dirty="0"/>
+          </a:p>
+        </p:txBody>
+      </p:sp>
+      <p:sp>
+        <p:nvSpPr>
+          <p:cNvPr id="4" name="Espace réservé du numéro de diapositive 3"/>
+          <p:cNvSpPr>
+            <a:spLocks noGrp="1"/>
+          </p:cNvSpPr>
+          <p:nvPr>
+            <p:ph type="sldNum" sz="quarter" idx="12"/>
+          </p:nvPr>
+        </p:nvSpPr>
+        <p:spPr>
+          <a:xfrm>
+            <a:off x="8532440" y="6407944"/>
+            <a:ext cx="480592" cy="365125"/>
+          </a:xfrm>
+        </p:spPr>
+        <p:txBody>
+          <a:bodyPr/>
+          <a:lstStyle/>
+          <a:p>
             <a:fld id="{BCF39854-5727-49C5-871A-2A9A28C6ADE3}" type="slidenum">
-              <a:rPr lang="fr-FR" smtClean="0"/>
+              <a:rPr lang="fr-FR" sz="1600" smtClean="0"/>
               <a:pPr/>
               <a:t>11</a:t>
             </a:fld>
-            <a:endParaRPr lang="fr-FR"/>
+            <a:endParaRPr lang="fr-FR" sz="1600"/>
           </a:p>
         </p:txBody>
       </p:sp>
       <p:pic>
         <p:nvPicPr>
-          <p:cNvPr id="6" name="Image 5" descr="logo-ens.png"/>
-          <p:cNvPicPr>
-            <a:picLocks noChangeAspect="1"/>
-          </p:cNvPicPr>
-          <p:nvPr/>
-        </p:nvPicPr>
-        <p:blipFill>
-          <a:blip r:embed="rId2" cstate="print"/>
-          <a:stretch>
-            <a:fillRect/>
-          </a:stretch>
-        </p:blipFill>
-        <p:spPr>
-          <a:xfrm>
-            <a:off x="7236296" y="188640"/>
-            <a:ext cx="1547664" cy="577812"/>
-          </a:xfrm>
-          <a:prstGeom prst="rect">
-            <a:avLst/>
-          </a:prstGeom>
-        </p:spPr>
-      </p:pic>
-      <p:pic>
-        <p:nvPicPr>
-          <p:cNvPr id="7" name="Image 6" descr="logo-lyon1.png"/>
-          <p:cNvPicPr>
-            <a:picLocks noChangeAspect="1"/>
-          </p:cNvPicPr>
-          <p:nvPr/>
-        </p:nvPicPr>
-        <p:blipFill>
-          <a:blip r:embed="rId3" cstate="print"/>
-          <a:stretch>
-            <a:fillRect/>
-          </a:stretch>
-        </p:blipFill>
-        <p:spPr>
-          <a:xfrm>
-            <a:off x="4572000" y="116632"/>
-            <a:ext cx="2309614" cy="609129"/>
-          </a:xfrm>
-          <a:prstGeom prst="rect">
-            <a:avLst/>
-          </a:prstGeom>
-        </p:spPr>
-      </p:pic>
-      <p:pic>
-        <p:nvPicPr>
-          <p:cNvPr id="4098" name="Picture 2"/>
+          <p:cNvPr id="10242" name="Picture 2" descr="http://www.belor.be/images/peb_V.jpg"/>
           <p:cNvPicPr>
             <a:picLocks noChangeAspect="1" noChangeArrowheads="1"/>
           </p:cNvPicPr>
           <p:nvPr/>
         </p:nvPicPr>
         <p:blipFill>
-          <a:blip r:embed="rId4" cstate="print"/>
+          <a:blip r:embed="rId3" cstate="print"/>
           <a:srcRect/>
           <a:stretch>
             <a:fillRect/>
@@ -5996,51 +6129,13 @@
         </p:blipFill>
         <p:spPr bwMode="auto">
           <a:xfrm>
-            <a:off x="2969102" y="1412776"/>
-            <a:ext cx="6139402" cy="2590465"/>
+            <a:off x="5148064" y="1916832"/>
+            <a:ext cx="3295650" cy="3295651"/>
           </a:xfrm>
           <a:prstGeom prst="rect">
             <a:avLst/>
           </a:prstGeom>
           <a:noFill/>
-          <a:ln w="9525">
-            <a:noFill/>
-            <a:miter lim="800000"/>
-            <a:headEnd/>
-            <a:tailEnd/>
-          </a:ln>
-        </p:spPr>
-      </p:pic>
-      <p:pic>
-        <p:nvPicPr>
-          <p:cNvPr id="4099" name="Picture 3"/>
-          <p:cNvPicPr>
-            <a:picLocks noChangeAspect="1" noChangeArrowheads="1"/>
-          </p:cNvPicPr>
-          <p:nvPr/>
-        </p:nvPicPr>
-        <p:blipFill>
-          <a:blip r:embed="rId5" cstate="print"/>
-          <a:srcRect/>
-          <a:stretch>
-            <a:fillRect/>
-          </a:stretch>
-        </p:blipFill>
-        <p:spPr bwMode="auto">
-          <a:xfrm>
-            <a:off x="2987824" y="3861048"/>
-            <a:ext cx="6156176" cy="2597543"/>
-          </a:xfrm>
-          <a:prstGeom prst="rect">
-            <a:avLst/>
-          </a:prstGeom>
-          <a:noFill/>
-          <a:ln w="9525">
-            <a:noFill/>
-            <a:miter lim="800000"/>
-            <a:headEnd/>
-            <a:tailEnd/>
-          </a:ln>
         </p:spPr>
       </p:pic>
     </p:spTree>
@@ -6094,8 +6189,8 @@
               <a:buNone/>
             </a:pPr>
             <a:r>
-              <a:rPr lang="fr-FR" dirty="0" smtClean="0"/>
-              <a:t>A - Bilan professionnel</a:t>
+              <a:rPr lang="fr-FR" b="1" dirty="0" smtClean="0"/>
+              <a:t>Bilan de recherche</a:t>
             </a:r>
           </a:p>
           <a:p>
@@ -6107,7 +6202,7 @@
           <a:p>
             <a:r>
               <a:rPr lang="fr-FR" dirty="0" smtClean="0"/>
-              <a:t>Le projet</a:t>
+              <a:t>S’informer</a:t>
             </a:r>
           </a:p>
           <a:p>
@@ -6116,7 +6211,7 @@
           <a:p>
             <a:r>
               <a:rPr lang="fr-FR" dirty="0" smtClean="0"/>
-              <a:t>L’objectif</a:t>
+              <a:t>Analyser</a:t>
             </a:r>
           </a:p>
           <a:p>
@@ -6125,7 +6220,7 @@
           <a:p>
             <a:r>
               <a:rPr lang="fr-FR" dirty="0" smtClean="0"/>
-              <a:t>Les contraintes</a:t>
+              <a:t>Déduire</a:t>
             </a:r>
             <a:endParaRPr lang="fr-FR" dirty="0"/>
           </a:p>
@@ -6148,7 +6243,7 @@
           <a:p>
             <a:r>
               <a:rPr lang="fr-FR" dirty="0" smtClean="0"/>
-              <a:t>IV - Bilan</a:t>
+              <a:t>Bilan</a:t>
             </a:r>
             <a:endParaRPr lang="fr-FR" dirty="0"/>
           </a:p>
@@ -6164,78 +6259,35 @@
             <p:ph type="sldNum" sz="quarter" idx="12"/>
           </p:nvPr>
         </p:nvSpPr>
-        <p:spPr/>
+        <p:spPr>
+          <a:xfrm>
+            <a:off x="8532440" y="6407944"/>
+            <a:ext cx="480592" cy="365125"/>
+          </a:xfrm>
+        </p:spPr>
         <p:txBody>
           <a:bodyPr/>
           <a:lstStyle/>
           <a:p>
             <a:fld id="{BCF39854-5727-49C5-871A-2A9A28C6ADE3}" type="slidenum">
-              <a:rPr lang="fr-FR" smtClean="0"/>
+              <a:rPr lang="fr-FR" sz="1600" smtClean="0"/>
               <a:pPr/>
               <a:t>12</a:t>
             </a:fld>
-            <a:endParaRPr lang="fr-FR"/>
+            <a:endParaRPr lang="fr-FR" sz="1600"/>
           </a:p>
         </p:txBody>
       </p:sp>
       <p:pic>
         <p:nvPicPr>
-          <p:cNvPr id="6" name="Image 5" descr="logo-ens.png"/>
-          <p:cNvPicPr>
-            <a:picLocks noChangeAspect="1"/>
-          </p:cNvPicPr>
-          <p:nvPr/>
-        </p:nvPicPr>
-        <p:blipFill>
-          <a:blip r:embed="rId2" cstate="print"/>
-          <a:stretch>
-            <a:fillRect/>
-          </a:stretch>
-        </p:blipFill>
-        <p:spPr>
-          <a:xfrm>
-            <a:off x="7236296" y="188640"/>
-            <a:ext cx="1547664" cy="577812"/>
-          </a:xfrm>
-          <a:prstGeom prst="rect">
-            <a:avLst/>
-          </a:prstGeom>
-        </p:spPr>
-      </p:pic>
-      <p:pic>
-        <p:nvPicPr>
-          <p:cNvPr id="7" name="Image 6" descr="logo-lyon1.png"/>
-          <p:cNvPicPr>
-            <a:picLocks noChangeAspect="1"/>
-          </p:cNvPicPr>
-          <p:nvPr/>
-        </p:nvPicPr>
-        <p:blipFill>
-          <a:blip r:embed="rId3" cstate="print"/>
-          <a:stretch>
-            <a:fillRect/>
-          </a:stretch>
-        </p:blipFill>
-        <p:spPr>
-          <a:xfrm>
-            <a:off x="4572000" y="116632"/>
-            <a:ext cx="2309614" cy="609129"/>
-          </a:xfrm>
-          <a:prstGeom prst="rect">
-            <a:avLst/>
-          </a:prstGeom>
-        </p:spPr>
-      </p:pic>
-      <p:pic>
-        <p:nvPicPr>
-          <p:cNvPr id="10242" name="Picture 2" descr="http://www.belor.be/images/peb_V.jpg"/>
+          <p:cNvPr id="9218" name="Picture 2" descr="http://www.roues-ages-trans-missions.sitew.fr/fs/ROUES_AGES/normal/79up2-fotolia_15998379_xs.jpg"/>
           <p:cNvPicPr>
             <a:picLocks noChangeAspect="1" noChangeArrowheads="1"/>
           </p:cNvPicPr>
           <p:nvPr/>
         </p:nvPicPr>
         <p:blipFill>
-          <a:blip r:embed="rId4" cstate="print"/>
+          <a:blip r:embed="rId2" cstate="print"/>
           <a:srcRect/>
           <a:stretch>
             <a:fillRect/>
@@ -6243,8 +6295,8 @@
         </p:blipFill>
         <p:spPr bwMode="auto">
           <a:xfrm>
-            <a:off x="5148064" y="1916832"/>
-            <a:ext cx="3295650" cy="3295651"/>
+            <a:off x="5004048" y="2132856"/>
+            <a:ext cx="2857500" cy="2857500"/>
           </a:xfrm>
           <a:prstGeom prst="rect">
             <a:avLst/>
@@ -6303,8 +6355,8 @@
               <a:buNone/>
             </a:pPr>
             <a:r>
-              <a:rPr lang="fr-FR" dirty="0" smtClean="0"/>
-              <a:t>B - Bilan de recherche</a:t>
+              <a:rPr lang="fr-FR" b="1" dirty="0" smtClean="0"/>
+              <a:t>Bilan relationnel</a:t>
             </a:r>
           </a:p>
           <a:p>
@@ -6316,7 +6368,7 @@
           <a:p>
             <a:r>
               <a:rPr lang="fr-FR" dirty="0" smtClean="0"/>
-              <a:t>S’informer</a:t>
+              <a:t>Autonomie</a:t>
             </a:r>
           </a:p>
           <a:p>
@@ -6325,7 +6377,7 @@
           <a:p>
             <a:r>
               <a:rPr lang="fr-FR" dirty="0" smtClean="0"/>
-              <a:t>Analyser</a:t>
+              <a:t>Prise de décision</a:t>
             </a:r>
           </a:p>
           <a:p>
@@ -6334,7 +6386,7 @@
           <a:p>
             <a:r>
               <a:rPr lang="fr-FR" dirty="0" smtClean="0"/>
-              <a:t>Déduire</a:t>
+              <a:t>Responsabilité</a:t>
             </a:r>
             <a:endParaRPr lang="fr-FR" dirty="0"/>
           </a:p>
@@ -6357,7 +6409,7 @@
           <a:p>
             <a:r>
               <a:rPr lang="fr-FR" dirty="0" smtClean="0"/>
-              <a:t>IV - Bilan</a:t>
+              <a:t>Bilan</a:t>
             </a:r>
             <a:endParaRPr lang="fr-FR" dirty="0"/>
           </a:p>
@@ -6373,78 +6425,35 @@
             <p:ph type="sldNum" sz="quarter" idx="12"/>
           </p:nvPr>
         </p:nvSpPr>
-        <p:spPr/>
+        <p:spPr>
+          <a:xfrm>
+            <a:off x="8460432" y="6407944"/>
+            <a:ext cx="552600" cy="365125"/>
+          </a:xfrm>
+        </p:spPr>
         <p:txBody>
           <a:bodyPr/>
           <a:lstStyle/>
           <a:p>
             <a:fld id="{BCF39854-5727-49C5-871A-2A9A28C6ADE3}" type="slidenum">
-              <a:rPr lang="fr-FR" smtClean="0"/>
+              <a:rPr lang="fr-FR" sz="1600" smtClean="0"/>
               <a:pPr/>
               <a:t>13</a:t>
             </a:fld>
-            <a:endParaRPr lang="fr-FR"/>
+            <a:endParaRPr lang="fr-FR" sz="1600" dirty="0"/>
           </a:p>
         </p:txBody>
       </p:sp>
       <p:pic>
         <p:nvPicPr>
-          <p:cNvPr id="6" name="Image 5" descr="logo-ens.png"/>
-          <p:cNvPicPr>
-            <a:picLocks noChangeAspect="1"/>
-          </p:cNvPicPr>
-          <p:nvPr/>
-        </p:nvPicPr>
-        <p:blipFill>
-          <a:blip r:embed="rId2" cstate="print"/>
-          <a:stretch>
-            <a:fillRect/>
-          </a:stretch>
-        </p:blipFill>
-        <p:spPr>
-          <a:xfrm>
-            <a:off x="7236296" y="188640"/>
-            <a:ext cx="1547664" cy="577812"/>
-          </a:xfrm>
-          <a:prstGeom prst="rect">
-            <a:avLst/>
-          </a:prstGeom>
-        </p:spPr>
-      </p:pic>
-      <p:pic>
-        <p:nvPicPr>
-          <p:cNvPr id="7" name="Image 6" descr="logo-lyon1.png"/>
-          <p:cNvPicPr>
-            <a:picLocks noChangeAspect="1"/>
-          </p:cNvPicPr>
-          <p:nvPr/>
-        </p:nvPicPr>
-        <p:blipFill>
-          <a:blip r:embed="rId3" cstate="print"/>
-          <a:stretch>
-            <a:fillRect/>
-          </a:stretch>
-        </p:blipFill>
-        <p:spPr>
-          <a:xfrm>
-            <a:off x="4572000" y="116632"/>
-            <a:ext cx="2309614" cy="609129"/>
-          </a:xfrm>
-          <a:prstGeom prst="rect">
-            <a:avLst/>
-          </a:prstGeom>
-        </p:spPr>
-      </p:pic>
-      <p:pic>
-        <p:nvPicPr>
-          <p:cNvPr id="9218" name="Picture 2" descr="http://www.roues-ages-trans-missions.sitew.fr/fs/ROUES_AGES/normal/79up2-fotolia_15998379_xs.jpg"/>
+          <p:cNvPr id="6146" name="Picture 2" descr="http://www.etgfc.com/wp-content/uploads/2010/10/bonhomme-blanc.png"/>
           <p:cNvPicPr>
             <a:picLocks noChangeAspect="1" noChangeArrowheads="1"/>
           </p:cNvPicPr>
           <p:nvPr/>
         </p:nvPicPr>
         <p:blipFill>
-          <a:blip r:embed="rId4" cstate="print"/>
+          <a:blip r:embed="rId2" cstate="print"/>
           <a:srcRect/>
           <a:stretch>
             <a:fillRect/>
@@ -6452,8 +6461,8 @@
         </p:blipFill>
         <p:spPr bwMode="auto">
           <a:xfrm>
-            <a:off x="5004048" y="2132856"/>
-            <a:ext cx="2857500" cy="2857500"/>
+            <a:off x="5724128" y="2204864"/>
+            <a:ext cx="2381250" cy="2381250"/>
           </a:xfrm>
           <a:prstGeom prst="rect">
             <a:avLst/>
@@ -6508,43 +6517,50 @@
           <a:bodyPr/>
           <a:lstStyle/>
           <a:p>
+            <a:endParaRPr lang="fr-FR" dirty="0" smtClean="0"/>
+          </a:p>
+          <a:p>
+            <a:endParaRPr lang="fr-FR" dirty="0" smtClean="0"/>
+          </a:p>
+          <a:p>
+            <a:r>
+              <a:rPr lang="fr-FR" dirty="0" smtClean="0"/>
+              <a:t>Bonne expérience</a:t>
+            </a:r>
+          </a:p>
+          <a:p>
+            <a:endParaRPr lang="fr-FR" dirty="0" smtClean="0"/>
+          </a:p>
+          <a:p>
+            <a:endParaRPr lang="fr-FR" dirty="0" smtClean="0"/>
+          </a:p>
+          <a:p>
+            <a:r>
+              <a:rPr lang="fr-FR" dirty="0" smtClean="0"/>
+              <a:t>Préférence du milieu </a:t>
+            </a:r>
+            <a:r>
+              <a:rPr lang="fr-FR" dirty="0" smtClean="0"/>
+              <a:t>professionnel</a:t>
+            </a:r>
+          </a:p>
+          <a:p>
+            <a:endParaRPr lang="fr-FR" dirty="0" smtClean="0"/>
+          </a:p>
+          <a:p>
+            <a:endParaRPr lang="fr-FR" dirty="0" smtClean="0"/>
+          </a:p>
+          <a:p>
+            <a:r>
+              <a:rPr lang="fr-FR" dirty="0" smtClean="0"/>
+              <a:t>https://github.com/hyptos/kyd</a:t>
+            </a:r>
+            <a:endParaRPr lang="fr-FR" dirty="0" smtClean="0"/>
+          </a:p>
+          <a:p>
             <a:pPr>
               <a:buNone/>
             </a:pPr>
-            <a:r>
-              <a:rPr lang="fr-FR" dirty="0" smtClean="0"/>
-              <a:t>C - Bilan relationnel</a:t>
-            </a:r>
-          </a:p>
-          <a:p>
-            <a:pPr>
-              <a:buNone/>
-            </a:pPr>
-            <a:endParaRPr lang="fr-FR" dirty="0" smtClean="0"/>
-          </a:p>
-          <a:p>
-            <a:r>
-              <a:rPr lang="fr-FR" dirty="0" smtClean="0"/>
-              <a:t>Autonomie</a:t>
-            </a:r>
-          </a:p>
-          <a:p>
-            <a:endParaRPr lang="fr-FR" dirty="0" smtClean="0"/>
-          </a:p>
-          <a:p>
-            <a:r>
-              <a:rPr lang="fr-FR" dirty="0" smtClean="0"/>
-              <a:t>Prise de décision</a:t>
-            </a:r>
-          </a:p>
-          <a:p>
-            <a:endParaRPr lang="fr-FR" dirty="0" smtClean="0"/>
-          </a:p>
-          <a:p>
-            <a:r>
-              <a:rPr lang="fr-FR" dirty="0" smtClean="0"/>
-              <a:t>Responsabilité</a:t>
-            </a:r>
             <a:endParaRPr lang="fr-FR" dirty="0"/>
           </a:p>
         </p:txBody>
@@ -6566,7 +6582,7 @@
           <a:p>
             <a:r>
               <a:rPr lang="fr-FR" dirty="0" smtClean="0"/>
-              <a:t>IV - Bilan</a:t>
+              <a:t>Conclusion</a:t>
             </a:r>
             <a:endParaRPr lang="fr-FR" dirty="0"/>
           </a:p>
@@ -6582,78 +6598,35 @@
             <p:ph type="sldNum" sz="quarter" idx="12"/>
           </p:nvPr>
         </p:nvSpPr>
-        <p:spPr/>
+        <p:spPr>
+          <a:xfrm>
+            <a:off x="8532440" y="6407944"/>
+            <a:ext cx="480592" cy="365125"/>
+          </a:xfrm>
+        </p:spPr>
         <p:txBody>
           <a:bodyPr/>
           <a:lstStyle/>
           <a:p>
             <a:fld id="{BCF39854-5727-49C5-871A-2A9A28C6ADE3}" type="slidenum">
-              <a:rPr lang="fr-FR" smtClean="0"/>
+              <a:rPr lang="fr-FR" sz="1600" smtClean="0"/>
               <a:pPr/>
               <a:t>14</a:t>
             </a:fld>
-            <a:endParaRPr lang="fr-FR"/>
+            <a:endParaRPr lang="fr-FR" sz="1600"/>
           </a:p>
         </p:txBody>
       </p:sp>
       <p:pic>
         <p:nvPicPr>
-          <p:cNvPr id="6" name="Image 5" descr="logo-ens.png"/>
-          <p:cNvPicPr>
-            <a:picLocks noChangeAspect="1"/>
-          </p:cNvPicPr>
-          <p:nvPr/>
-        </p:nvPicPr>
-        <p:blipFill>
-          <a:blip r:embed="rId2" cstate="print"/>
-          <a:stretch>
-            <a:fillRect/>
-          </a:stretch>
-        </p:blipFill>
-        <p:spPr>
-          <a:xfrm>
-            <a:off x="7236296" y="188640"/>
-            <a:ext cx="1547664" cy="577812"/>
-          </a:xfrm>
-          <a:prstGeom prst="rect">
-            <a:avLst/>
-          </a:prstGeom>
-        </p:spPr>
-      </p:pic>
-      <p:pic>
-        <p:nvPicPr>
-          <p:cNvPr id="7" name="Image 6" descr="logo-lyon1.png"/>
-          <p:cNvPicPr>
-            <a:picLocks noChangeAspect="1"/>
-          </p:cNvPicPr>
-          <p:nvPr/>
-        </p:nvPicPr>
-        <p:blipFill>
-          <a:blip r:embed="rId3" cstate="print"/>
-          <a:stretch>
-            <a:fillRect/>
-          </a:stretch>
-        </p:blipFill>
-        <p:spPr>
-          <a:xfrm>
-            <a:off x="4572000" y="116632"/>
-            <a:ext cx="2309614" cy="609129"/>
-          </a:xfrm>
-          <a:prstGeom prst="rect">
-            <a:avLst/>
-          </a:prstGeom>
-        </p:spPr>
-      </p:pic>
-      <p:pic>
-        <p:nvPicPr>
-          <p:cNvPr id="6146" name="Picture 2" descr="http://www.etgfc.com/wp-content/uploads/2010/10/bonhomme-blanc.png"/>
+          <p:cNvPr id="5122" name="Picture 2" descr="http://blog.valoxy.org/wp-content/uploads/2013/05/%C3%A9capitaux-propres-300x198.png"/>
           <p:cNvPicPr>
             <a:picLocks noChangeAspect="1" noChangeArrowheads="1"/>
           </p:cNvPicPr>
           <p:nvPr/>
         </p:nvPicPr>
         <p:blipFill>
-          <a:blip r:embed="rId4" cstate="print"/>
+          <a:blip r:embed="rId2" cstate="print"/>
           <a:srcRect/>
           <a:stretch>
             <a:fillRect/>
@@ -6661,8 +6634,8 @@
         </p:blipFill>
         <p:spPr bwMode="auto">
           <a:xfrm>
-            <a:off x="5724128" y="2204864"/>
-            <a:ext cx="2381250" cy="2381250"/>
+            <a:off x="5004048" y="1268760"/>
+            <a:ext cx="3384376" cy="2233688"/>
           </a:xfrm>
           <a:prstGeom prst="rect">
             <a:avLst/>
@@ -6704,12 +6677,12 @@
       </p:grpSpPr>
       <p:sp>
         <p:nvSpPr>
-          <p:cNvPr id="2" name="Espace réservé du contenu 1"/>
-          <p:cNvSpPr>
-            <a:spLocks noGrp="1"/>
-          </p:cNvSpPr>
-          <p:nvPr>
-            <p:ph idx="1"/>
+          <p:cNvPr id="3" name="Titre 2"/>
+          <p:cNvSpPr>
+            <a:spLocks noGrp="1"/>
+          </p:cNvSpPr>
+          <p:nvPr>
+            <p:ph type="title"/>
           </p:nvPr>
         </p:nvSpPr>
         <p:spPr/>
@@ -6717,115 +6690,54 @@
           <a:bodyPr/>
           <a:lstStyle/>
           <a:p>
-            <a:endParaRPr lang="fr-FR" dirty="0" smtClean="0"/>
-          </a:p>
-          <a:p>
-            <a:endParaRPr lang="fr-FR" dirty="0" smtClean="0"/>
-          </a:p>
-          <a:p>
             <a:r>
               <a:rPr lang="fr-FR" dirty="0" smtClean="0"/>
-              <a:t>Bonne expérience</a:t>
-            </a:r>
-          </a:p>
-          <a:p>
-            <a:endParaRPr lang="fr-FR" dirty="0" smtClean="0"/>
-          </a:p>
-          <a:p>
-            <a:endParaRPr lang="fr-FR" dirty="0" smtClean="0"/>
-          </a:p>
-          <a:p>
-            <a:r>
-              <a:rPr lang="fr-FR" dirty="0" smtClean="0"/>
-              <a:t>Préférence du milieu professionnel</a:t>
-            </a:r>
-          </a:p>
-          <a:p>
-            <a:pPr>
-              <a:buNone/>
-            </a:pPr>
+              <a:t>Démonstration</a:t>
+            </a:r>
             <a:endParaRPr lang="fr-FR" dirty="0"/>
           </a:p>
         </p:txBody>
       </p:sp>
       <p:sp>
         <p:nvSpPr>
-          <p:cNvPr id="3" name="Titre 2"/>
-          <p:cNvSpPr>
-            <a:spLocks noGrp="1"/>
-          </p:cNvSpPr>
-          <p:nvPr>
-            <p:ph type="title"/>
-          </p:nvPr>
-        </p:nvSpPr>
-        <p:spPr/>
+          <p:cNvPr id="4" name="Espace réservé du numéro de diapositive 3"/>
+          <p:cNvSpPr>
+            <a:spLocks noGrp="1"/>
+          </p:cNvSpPr>
+          <p:nvPr>
+            <p:ph type="sldNum" sz="quarter" idx="12"/>
+          </p:nvPr>
+        </p:nvSpPr>
+        <p:spPr>
+          <a:xfrm>
+            <a:off x="8532440" y="6407944"/>
+            <a:ext cx="480592" cy="365125"/>
+          </a:xfrm>
+        </p:spPr>
         <p:txBody>
           <a:bodyPr/>
           <a:lstStyle/>
           <a:p>
-            <a:r>
-              <a:rPr lang="fr-FR" dirty="0" smtClean="0"/>
-              <a:t>Conclusion</a:t>
-            </a:r>
-            <a:endParaRPr lang="fr-FR" dirty="0"/>
-          </a:p>
-        </p:txBody>
-      </p:sp>
-      <p:sp>
-        <p:nvSpPr>
-          <p:cNvPr id="4" name="Espace réservé du numéro de diapositive 3"/>
-          <p:cNvSpPr>
-            <a:spLocks noGrp="1"/>
-          </p:cNvSpPr>
-          <p:nvPr>
-            <p:ph type="sldNum" sz="quarter" idx="12"/>
-          </p:nvPr>
-        </p:nvSpPr>
-        <p:spPr/>
-        <p:txBody>
-          <a:bodyPr/>
-          <a:lstStyle/>
-          <a:p>
             <a:fld id="{BCF39854-5727-49C5-871A-2A9A28C6ADE3}" type="slidenum">
-              <a:rPr lang="fr-FR" smtClean="0"/>
+              <a:rPr lang="fr-FR" sz="1600" smtClean="0"/>
               <a:pPr/>
               <a:t>15</a:t>
             </a:fld>
-            <a:endParaRPr lang="fr-FR"/>
+            <a:endParaRPr lang="fr-FR" sz="1600" dirty="0"/>
           </a:p>
         </p:txBody>
       </p:sp>
       <p:pic>
         <p:nvPicPr>
-          <p:cNvPr id="6" name="Image 5" descr="logo-ens.png"/>
+          <p:cNvPr id="5" name="TERPres.wmv">
+            <a:hlinkClick r:id="" action="ppaction://media"/>
+          </p:cNvPr>
           <p:cNvPicPr>
-            <a:picLocks noChangeAspect="1"/>
+            <a:picLocks noRot="1" noChangeAspect="1"/>
           </p:cNvPicPr>
-          <p:nvPr/>
-        </p:nvPicPr>
-        <p:blipFill>
-          <a:blip r:embed="rId2" cstate="print"/>
-          <a:stretch>
-            <a:fillRect/>
-          </a:stretch>
-        </p:blipFill>
-        <p:spPr>
-          <a:xfrm>
-            <a:off x="7236296" y="188640"/>
-            <a:ext cx="1547664" cy="577812"/>
-          </a:xfrm>
-          <a:prstGeom prst="rect">
-            <a:avLst/>
-          </a:prstGeom>
-        </p:spPr>
-      </p:pic>
-      <p:pic>
-        <p:nvPicPr>
-          <p:cNvPr id="7" name="Image 6" descr="logo-lyon1.png"/>
-          <p:cNvPicPr>
-            <a:picLocks noChangeAspect="1"/>
-          </p:cNvPicPr>
-          <p:nvPr/>
+          <p:nvPr>
+            <a:videoFile r:link="rId1"/>
+          </p:nvPr>
         </p:nvPicPr>
         <p:blipFill>
           <a:blip r:embed="rId3" cstate="print"/>
@@ -6835,189 +6747,8 @@
         </p:blipFill>
         <p:spPr>
           <a:xfrm>
-            <a:off x="4572000" y="116632"/>
-            <a:ext cx="2309614" cy="609129"/>
-          </a:xfrm>
-          <a:prstGeom prst="rect">
-            <a:avLst/>
-          </a:prstGeom>
-        </p:spPr>
-      </p:pic>
-      <p:pic>
-        <p:nvPicPr>
-          <p:cNvPr id="5122" name="Picture 2" descr="http://blog.valoxy.org/wp-content/uploads/2013/05/%C3%A9capitaux-propres-300x198.png"/>
-          <p:cNvPicPr>
-            <a:picLocks noChangeAspect="1" noChangeArrowheads="1"/>
-          </p:cNvPicPr>
-          <p:nvPr/>
-        </p:nvPicPr>
-        <p:blipFill>
-          <a:blip r:embed="rId4" cstate="print"/>
-          <a:srcRect/>
-          <a:stretch>
-            <a:fillRect/>
-          </a:stretch>
-        </p:blipFill>
-        <p:spPr bwMode="auto">
-          <a:xfrm>
-            <a:off x="5292080" y="1700808"/>
-            <a:ext cx="2857500" cy="1885950"/>
-          </a:xfrm>
-          <a:prstGeom prst="rect">
-            <a:avLst/>
-          </a:prstGeom>
-          <a:noFill/>
-        </p:spPr>
-      </p:pic>
-    </p:spTree>
-  </p:cSld>
-  <p:clrMapOvr>
-    <a:masterClrMapping/>
-  </p:clrMapOvr>
-  <p:timing>
-    <p:tnLst>
-      <p:par>
-        <p:cTn id="1" dur="indefinite" restart="never" nodeType="tmRoot"/>
-      </p:par>
-    </p:tnLst>
-  </p:timing>
-</p:sld>
-</file>
-
-<file path=ppt/slides/slide16.xml><?xml version="1.0" encoding="utf-8"?>
-<p:sld xmlns:a="http://schemas.openxmlformats.org/drawingml/2006/main" xmlns:r="http://schemas.openxmlformats.org/officeDocument/2006/relationships" xmlns:p="http://schemas.openxmlformats.org/presentationml/2006/main">
-  <p:cSld>
-    <p:spTree>
-      <p:nvGrpSpPr>
-        <p:cNvPr id="1" name=""/>
-        <p:cNvGrpSpPr/>
-        <p:nvPr/>
-      </p:nvGrpSpPr>
-      <p:grpSpPr>
-        <a:xfrm>
-          <a:off x="0" y="0"/>
-          <a:ext cx="0" cy="0"/>
-          <a:chOff x="0" y="0"/>
-          <a:chExt cx="0" cy="0"/>
-        </a:xfrm>
-      </p:grpSpPr>
-      <p:sp>
-        <p:nvSpPr>
-          <p:cNvPr id="3" name="Titre 2"/>
-          <p:cNvSpPr>
-            <a:spLocks noGrp="1"/>
-          </p:cNvSpPr>
-          <p:nvPr>
-            <p:ph type="title"/>
-          </p:nvPr>
-        </p:nvSpPr>
-        <p:spPr/>
-        <p:txBody>
-          <a:bodyPr/>
-          <a:lstStyle/>
-          <a:p>
-            <a:r>
-              <a:rPr lang="fr-FR" dirty="0" smtClean="0"/>
-              <a:t>Démonstration</a:t>
-            </a:r>
-            <a:endParaRPr lang="fr-FR" dirty="0"/>
-          </a:p>
-        </p:txBody>
-      </p:sp>
-      <p:sp>
-        <p:nvSpPr>
-          <p:cNvPr id="4" name="Espace réservé du numéro de diapositive 3"/>
-          <p:cNvSpPr>
-            <a:spLocks noGrp="1"/>
-          </p:cNvSpPr>
-          <p:nvPr>
-            <p:ph type="sldNum" sz="quarter" idx="12"/>
-          </p:nvPr>
-        </p:nvSpPr>
-        <p:spPr/>
-        <p:txBody>
-          <a:bodyPr/>
-          <a:lstStyle/>
-          <a:p>
-            <a:fld id="{BCF39854-5727-49C5-871A-2A9A28C6ADE3}" type="slidenum">
-              <a:rPr lang="fr-FR" smtClean="0"/>
-              <a:pPr/>
-              <a:t>16</a:t>
-            </a:fld>
-            <a:endParaRPr lang="fr-FR"/>
-          </a:p>
-        </p:txBody>
-      </p:sp>
-      <p:pic>
-        <p:nvPicPr>
-          <p:cNvPr id="6" name="Image 5" descr="logo-ens.png"/>
-          <p:cNvPicPr>
-            <a:picLocks noChangeAspect="1"/>
-          </p:cNvPicPr>
-          <p:nvPr/>
-        </p:nvPicPr>
-        <p:blipFill>
-          <a:blip r:embed="rId3" cstate="print"/>
-          <a:stretch>
-            <a:fillRect/>
-          </a:stretch>
-        </p:blipFill>
-        <p:spPr>
-          <a:xfrm>
-            <a:off x="7236296" y="188640"/>
-            <a:ext cx="1547664" cy="577812"/>
-          </a:xfrm>
-          <a:prstGeom prst="rect">
-            <a:avLst/>
-          </a:prstGeom>
-        </p:spPr>
-      </p:pic>
-      <p:pic>
-        <p:nvPicPr>
-          <p:cNvPr id="7" name="Image 6" descr="logo-lyon1.png"/>
-          <p:cNvPicPr>
-            <a:picLocks noChangeAspect="1"/>
-          </p:cNvPicPr>
-          <p:nvPr/>
-        </p:nvPicPr>
-        <p:blipFill>
-          <a:blip r:embed="rId4" cstate="print"/>
-          <a:stretch>
-            <a:fillRect/>
-          </a:stretch>
-        </p:blipFill>
-        <p:spPr>
-          <a:xfrm>
-            <a:off x="4572000" y="116632"/>
-            <a:ext cx="2309614" cy="609129"/>
-          </a:xfrm>
-          <a:prstGeom prst="rect">
-            <a:avLst/>
-          </a:prstGeom>
-        </p:spPr>
-      </p:pic>
-      <p:pic>
-        <p:nvPicPr>
-          <p:cNvPr id="8" name="TERPres.wmv">
-            <a:hlinkClick r:id="" action="ppaction://media"/>
-          </p:cNvPr>
-          <p:cNvPicPr>
-            <a:picLocks noRot="1" noChangeAspect="1"/>
-          </p:cNvPicPr>
-          <p:nvPr>
-            <a:videoFile r:link="rId1"/>
-          </p:nvPr>
-        </p:nvPicPr>
-        <p:blipFill>
-          <a:blip r:embed="rId5" cstate="print"/>
-          <a:stretch>
-            <a:fillRect/>
-          </a:stretch>
-        </p:blipFill>
-        <p:spPr>
-          <a:xfrm>
-            <a:off x="0" y="0"/>
-            <a:ext cx="9144000" cy="6858000"/>
+            <a:off x="0" y="1124744"/>
+            <a:ext cx="9144000" cy="5133229"/>
           </a:xfrm>
           <a:prstGeom prst="rect">
             <a:avLst/>
@@ -7039,7 +6770,7 @@
                 <p:stCondLst>
                   <p:cond evt="onClick" delay="0">
                     <p:tgtEl>
-                      <p:spTgt spid="8"/>
+                      <p:spTgt spid="5"/>
                     </p:tgtEl>
                   </p:cond>
                 </p:stCondLst>
@@ -7069,7 +6800,7 @@
                                       <p:cBhvr>
                                         <p:cTn id="6" dur="1" fill="hold"/>
                                         <p:tgtEl>
-                                          <p:spTgt spid="8"/>
+                                          <p:spTgt spid="5"/>
                                         </p:tgtEl>
                                       </p:cBhvr>
                                     </p:cmd>
@@ -7087,7 +6818,7 @@
               <p:nextCondLst>
                 <p:cond evt="onClick" delay="0">
                   <p:tgtEl>
-                    <p:spTgt spid="8"/>
+                    <p:spTgt spid="5"/>
                   </p:tgtEl>
                 </p:cond>
               </p:nextCondLst>
@@ -7112,7 +6843,7 @@
                   </p:endCondLst>
                 </p:cTn>
                 <p:tgtEl>
-                  <p:spTgt spid="8"/>
+                  <p:spTgt spid="5"/>
                 </p:tgtEl>
               </p:cMediaNode>
             </p:video>
@@ -7124,7 +6855,7 @@
 </p:sld>
 </file>
 
-<file path=ppt/slides/slide17.xml><?xml version="1.0" encoding="utf-8"?>
+<file path=ppt/slides/slide16.xml><?xml version="1.0" encoding="utf-8"?>
 <p:sld xmlns:a="http://schemas.openxmlformats.org/drawingml/2006/main" xmlns:r="http://schemas.openxmlformats.org/officeDocument/2006/relationships" xmlns:p="http://schemas.openxmlformats.org/presentationml/2006/main">
   <p:cSld>
     <p:spTree>
@@ -7242,17 +6973,22 @@
             <p:ph type="sldNum" sz="quarter" idx="12"/>
           </p:nvPr>
         </p:nvSpPr>
-        <p:spPr/>
+        <p:spPr>
+          <a:xfrm>
+            <a:off x="8532440" y="6407944"/>
+            <a:ext cx="480592" cy="365125"/>
+          </a:xfrm>
+        </p:spPr>
         <p:txBody>
           <a:bodyPr/>
           <a:lstStyle/>
           <a:p>
             <a:fld id="{BCF39854-5727-49C5-871A-2A9A28C6ADE3}" type="slidenum">
-              <a:rPr lang="fr-FR" smtClean="0"/>
+              <a:rPr lang="fr-FR" sz="1600" smtClean="0"/>
               <a:pPr/>
-              <a:t>17</a:t>
+              <a:t>16</a:t>
             </a:fld>
-            <a:endParaRPr lang="fr-FR"/>
+            <a:endParaRPr lang="fr-FR" sz="1600"/>
           </a:p>
         </p:txBody>
       </p:sp>
@@ -7390,16 +7126,25 @@
           <a:p>
             <a:r>
               <a:rPr lang="fr-FR" dirty="0" smtClean="0"/>
-              <a:t>I - Recherche</a:t>
-            </a:r>
-          </a:p>
-          <a:p>
+              <a:t>Recherche</a:t>
+            </a:r>
             <a:endParaRPr lang="fr-FR" dirty="0" smtClean="0"/>
           </a:p>
           <a:p>
+            <a:endParaRPr lang="fr-FR" dirty="0" smtClean="0"/>
+          </a:p>
+          <a:p>
             <a:r>
               <a:rPr lang="fr-FR" dirty="0" smtClean="0"/>
-              <a:t>II - KYD</a:t>
+              <a:t>Know </a:t>
+            </a:r>
+            <a:r>
+              <a:rPr lang="fr-FR" dirty="0" err="1" smtClean="0"/>
+              <a:t>Your</a:t>
+            </a:r>
+            <a:r>
+              <a:rPr lang="fr-FR" dirty="0" smtClean="0"/>
+              <a:t> Data</a:t>
             </a:r>
           </a:p>
           <a:p>
@@ -7408,7 +7153,7 @@
           <a:p>
             <a:r>
               <a:rPr lang="fr-FR" dirty="0" smtClean="0"/>
-              <a:t>III - Analyse</a:t>
+              <a:t>Analyse</a:t>
             </a:r>
           </a:p>
           <a:p>
@@ -7417,7 +7162,7 @@
           <a:p>
             <a:r>
               <a:rPr lang="fr-FR" dirty="0" smtClean="0"/>
-              <a:t>IV - Bilan</a:t>
+              <a:t>Bilan</a:t>
             </a:r>
           </a:p>
           <a:p>
@@ -7471,62 +7216,14 @@
           <a:lstStyle/>
           <a:p>
             <a:fld id="{BCF39854-5727-49C5-871A-2A9A28C6ADE3}" type="slidenum">
-              <a:rPr lang="fr-FR" smtClean="0"/>
+              <a:rPr lang="fr-FR" sz="1600" smtClean="0"/>
               <a:pPr/>
               <a:t>2</a:t>
             </a:fld>
-            <a:endParaRPr lang="fr-FR"/>
-          </a:p>
-        </p:txBody>
-      </p:sp>
-      <p:pic>
-        <p:nvPicPr>
-          <p:cNvPr id="8" name="Image 7" descr="logo-ens.png"/>
-          <p:cNvPicPr>
-            <a:picLocks noChangeAspect="1"/>
-          </p:cNvPicPr>
-          <p:nvPr/>
-        </p:nvPicPr>
-        <p:blipFill>
-          <a:blip r:embed="rId3" cstate="print"/>
-          <a:stretch>
-            <a:fillRect/>
-          </a:stretch>
-        </p:blipFill>
-        <p:spPr>
-          <a:xfrm>
-            <a:off x="7236296" y="188640"/>
-            <a:ext cx="1547664" cy="577812"/>
-          </a:xfrm>
-          <a:prstGeom prst="rect">
-            <a:avLst/>
-          </a:prstGeom>
-        </p:spPr>
-      </p:pic>
-      <p:pic>
-        <p:nvPicPr>
-          <p:cNvPr id="9" name="Image 8" descr="logo-lyon1.png"/>
-          <p:cNvPicPr>
-            <a:picLocks noChangeAspect="1"/>
-          </p:cNvPicPr>
-          <p:nvPr/>
-        </p:nvPicPr>
-        <p:blipFill>
-          <a:blip r:embed="rId4" cstate="print"/>
-          <a:stretch>
-            <a:fillRect/>
-          </a:stretch>
-        </p:blipFill>
-        <p:spPr>
-          <a:xfrm>
-            <a:off x="4572000" y="116632"/>
-            <a:ext cx="2309614" cy="609129"/>
-          </a:xfrm>
-          <a:prstGeom prst="rect">
-            <a:avLst/>
-          </a:prstGeom>
-        </p:spPr>
-      </p:pic>
+            <a:endParaRPr lang="fr-FR" sz="1600" dirty="0"/>
+          </a:p>
+        </p:txBody>
+      </p:sp>
       <p:pic>
         <p:nvPicPr>
           <p:cNvPr id="19458" name="Picture 2" descr="http://www.diagonales-formations.fr/uploads/bonhommes/bilan-de-competences-a-nice.jpg"/>
@@ -7536,7 +7233,7 @@
           <p:nvPr/>
         </p:nvPicPr>
         <p:blipFill>
-          <a:blip r:embed="rId5" cstate="print"/>
+          <a:blip r:embed="rId3" cstate="print"/>
           <a:srcRect/>
           <a:stretch>
             <a:fillRect/>
@@ -7597,61 +7294,92 @@
         </p:nvSpPr>
         <p:spPr/>
         <p:txBody>
+          <a:bodyPr>
+            <a:normAutofit/>
+          </a:bodyPr>
+          <a:lstStyle/>
+          <a:p>
+            <a:r>
+              <a:rPr lang="fr-FR" dirty="0" smtClean="0"/>
+              <a:t>Un monde interconnecté</a:t>
+            </a:r>
+          </a:p>
+          <a:p>
+            <a:endParaRPr lang="fr-FR" dirty="0" smtClean="0"/>
+          </a:p>
+          <a:p>
+            <a:r>
+              <a:rPr lang="fr-FR" dirty="0" err="1" smtClean="0"/>
+              <a:t>Big</a:t>
+            </a:r>
+            <a:r>
+              <a:rPr lang="fr-FR" dirty="0" smtClean="0"/>
+              <a:t> Data</a:t>
+            </a:r>
+          </a:p>
+          <a:p>
+            <a:endParaRPr lang="fr-FR" dirty="0" smtClean="0"/>
+          </a:p>
+          <a:p>
+            <a:r>
+              <a:rPr lang="fr-FR" dirty="0" smtClean="0"/>
+              <a:t>Transfert de données</a:t>
+            </a:r>
+          </a:p>
+          <a:p>
+            <a:endParaRPr lang="fr-FR" dirty="0" smtClean="0"/>
+          </a:p>
+          <a:p>
+            <a:r>
+              <a:rPr lang="fr-FR" i="1" dirty="0" smtClean="0"/>
+              <a:t>Cloud</a:t>
+            </a:r>
+          </a:p>
+          <a:p>
+            <a:endParaRPr lang="fr-FR" dirty="0" smtClean="0"/>
+          </a:p>
+          <a:p>
+            <a:r>
+              <a:rPr lang="fr-FR" dirty="0" smtClean="0"/>
+              <a:t>Aide à la décision</a:t>
+            </a:r>
+          </a:p>
+          <a:p>
+            <a:endParaRPr lang="fr-FR" dirty="0"/>
+          </a:p>
+        </p:txBody>
+      </p:sp>
+      <p:sp>
+        <p:nvSpPr>
+          <p:cNvPr id="3" name="Titre 2"/>
+          <p:cNvSpPr>
+            <a:spLocks noGrp="1"/>
+          </p:cNvSpPr>
+          <p:nvPr>
+            <p:ph type="title"/>
+          </p:nvPr>
+        </p:nvSpPr>
+        <p:spPr/>
+        <p:txBody>
           <a:bodyPr/>
           <a:lstStyle/>
           <a:p>
-            <a:endParaRPr lang="fr-FR" dirty="0" smtClean="0"/>
-          </a:p>
-          <a:p>
             <a:r>
               <a:rPr lang="fr-FR" dirty="0" smtClean="0"/>
-              <a:t>Un monde interconnecté</a:t>
-            </a:r>
-          </a:p>
-          <a:p>
-            <a:endParaRPr lang="fr-FR" dirty="0" smtClean="0"/>
-          </a:p>
-          <a:p>
-            <a:r>
-              <a:rPr lang="fr-FR" dirty="0" err="1" smtClean="0"/>
-              <a:t>Big</a:t>
-            </a:r>
-            <a:r>
-              <a:rPr lang="fr-FR" dirty="0" smtClean="0"/>
-              <a:t> Data</a:t>
-            </a:r>
-          </a:p>
-          <a:p>
-            <a:endParaRPr lang="fr-FR" dirty="0" smtClean="0"/>
-          </a:p>
-          <a:p>
-            <a:r>
-              <a:rPr lang="fr-FR" dirty="0" smtClean="0"/>
-              <a:t>Transfert de données</a:t>
-            </a:r>
-          </a:p>
-          <a:p>
-            <a:endParaRPr lang="fr-FR" dirty="0" smtClean="0"/>
-          </a:p>
-          <a:p>
-            <a:r>
-              <a:rPr lang="fr-FR" dirty="0" smtClean="0"/>
-              <a:t>Aide à la décision</a:t>
-            </a:r>
-          </a:p>
-          <a:p>
+              <a:t>Introduction</a:t>
+            </a:r>
             <a:endParaRPr lang="fr-FR" dirty="0"/>
           </a:p>
         </p:txBody>
       </p:sp>
       <p:sp>
         <p:nvSpPr>
-          <p:cNvPr id="3" name="Titre 2"/>
-          <p:cNvSpPr>
-            <a:spLocks noGrp="1"/>
-          </p:cNvSpPr>
-          <p:nvPr>
-            <p:ph type="title"/>
+          <p:cNvPr id="4" name="Espace réservé du numéro de diapositive 3"/>
+          <p:cNvSpPr>
+            <a:spLocks noGrp="1"/>
+          </p:cNvSpPr>
+          <p:nvPr>
+            <p:ph type="sldNum" sz="quarter" idx="12"/>
           </p:nvPr>
         </p:nvSpPr>
         <p:spPr/>
@@ -7659,86 +7387,15 @@
           <a:bodyPr/>
           <a:lstStyle/>
           <a:p>
-            <a:r>
-              <a:rPr lang="fr-FR" dirty="0" smtClean="0"/>
-              <a:t>Introduction</a:t>
-            </a:r>
-            <a:endParaRPr lang="fr-FR" dirty="0"/>
-          </a:p>
-        </p:txBody>
-      </p:sp>
-      <p:sp>
-        <p:nvSpPr>
-          <p:cNvPr id="4" name="Espace réservé du numéro de diapositive 3"/>
-          <p:cNvSpPr>
-            <a:spLocks noGrp="1"/>
-          </p:cNvSpPr>
-          <p:nvPr>
-            <p:ph type="sldNum" sz="quarter" idx="12"/>
-          </p:nvPr>
-        </p:nvSpPr>
-        <p:spPr/>
-        <p:txBody>
-          <a:bodyPr/>
-          <a:lstStyle/>
-          <a:p>
             <a:fld id="{BCF39854-5727-49C5-871A-2A9A28C6ADE3}" type="slidenum">
-              <a:rPr lang="fr-FR" smtClean="0"/>
+              <a:rPr lang="fr-FR" sz="1600" smtClean="0"/>
               <a:pPr/>
               <a:t>3</a:t>
             </a:fld>
-            <a:endParaRPr lang="fr-FR"/>
-          </a:p>
-        </p:txBody>
-      </p:sp>
-      <p:pic>
-        <p:nvPicPr>
-          <p:cNvPr id="9" name="Image 8" descr="logo-ens.png"/>
-          <p:cNvPicPr>
-            <a:picLocks noChangeAspect="1"/>
-          </p:cNvPicPr>
-          <p:nvPr/>
-        </p:nvPicPr>
-        <p:blipFill>
-          <a:blip r:embed="rId3" cstate="print"/>
-          <a:stretch>
-            <a:fillRect/>
-          </a:stretch>
-        </p:blipFill>
-        <p:spPr>
-          <a:xfrm>
-            <a:off x="7236296" y="188640"/>
-            <a:ext cx="1547664" cy="577812"/>
-          </a:xfrm>
-          <a:prstGeom prst="rect">
-            <a:avLst/>
-          </a:prstGeom>
-        </p:spPr>
-      </p:pic>
-      <p:pic>
-        <p:nvPicPr>
-          <p:cNvPr id="10" name="Image 9" descr="logo-lyon1.png"/>
-          <p:cNvPicPr>
-            <a:picLocks noChangeAspect="1"/>
-          </p:cNvPicPr>
-          <p:nvPr/>
-        </p:nvPicPr>
-        <p:blipFill>
-          <a:blip r:embed="rId4" cstate="print"/>
-          <a:stretch>
-            <a:fillRect/>
-          </a:stretch>
-        </p:blipFill>
-        <p:spPr>
-          <a:xfrm>
-            <a:off x="4572000" y="116632"/>
-            <a:ext cx="2309614" cy="609129"/>
-          </a:xfrm>
-          <a:prstGeom prst="rect">
-            <a:avLst/>
-          </a:prstGeom>
-        </p:spPr>
-      </p:pic>
+            <a:endParaRPr lang="fr-FR" sz="1600" dirty="0"/>
+          </a:p>
+        </p:txBody>
+      </p:sp>
       <p:pic>
         <p:nvPicPr>
           <p:cNvPr id="17410" name="Picture 2" descr="http://img.over-blog-kiwi.com/0/52/48/49/201306/ob_7462256963cd24b3688d023da59ae0ff_bonhomme-chemin.jpg"/>
@@ -7748,7 +7405,7 @@
           <p:nvPr/>
         </p:nvPicPr>
         <p:blipFill>
-          <a:blip r:embed="rId5" cstate="print"/>
+          <a:blip r:embed="rId3" cstate="print"/>
           <a:srcRect/>
           <a:stretch>
             <a:fillRect/>
@@ -7816,8 +7473,8 @@
               <a:buNone/>
             </a:pPr>
             <a:r>
-              <a:rPr lang="fr-FR" dirty="0" smtClean="0"/>
-              <a:t>A - Solutions de stockage</a:t>
+              <a:rPr lang="fr-FR" b="1" dirty="0" smtClean="0"/>
+              <a:t>Solutions de stockage</a:t>
             </a:r>
           </a:p>
           <a:p>
@@ -7883,7 +7540,7 @@
           <a:p>
             <a:r>
               <a:rPr lang="fr-FR" dirty="0" smtClean="0"/>
-              <a:t>I - Recherche</a:t>
+              <a:t>Recherche</a:t>
             </a:r>
             <a:endParaRPr lang="fr-FR" dirty="0"/>
           </a:p>
@@ -7905,65 +7562,81 @@
           <a:lstStyle/>
           <a:p>
             <a:fld id="{BCF39854-5727-49C5-871A-2A9A28C6ADE3}" type="slidenum">
-              <a:rPr lang="fr-FR" smtClean="0"/>
+              <a:rPr lang="fr-FR" sz="1600" smtClean="0"/>
               <a:pPr/>
               <a:t>4</a:t>
             </a:fld>
-            <a:endParaRPr lang="fr-FR"/>
+            <a:endParaRPr lang="fr-FR" sz="1600" dirty="0"/>
           </a:p>
         </p:txBody>
       </p:sp>
       <p:pic>
         <p:nvPicPr>
-          <p:cNvPr id="6" name="Image 5" descr="logo-ens.png"/>
+          <p:cNvPr id="15362" name="Picture 2"/>
           <p:cNvPicPr>
-            <a:picLocks noChangeAspect="1"/>
+            <a:picLocks noChangeAspect="1" noChangeArrowheads="1"/>
           </p:cNvPicPr>
           <p:nvPr/>
         </p:nvPicPr>
         <p:blipFill>
           <a:blip r:embed="rId3" cstate="print"/>
+          <a:srcRect/>
           <a:stretch>
             <a:fillRect/>
           </a:stretch>
         </p:blipFill>
-        <p:spPr>
+        <p:spPr bwMode="auto">
           <a:xfrm>
-            <a:off x="7236296" y="188640"/>
-            <a:ext cx="1547664" cy="577812"/>
+            <a:off x="6012160" y="1340768"/>
+            <a:ext cx="1008112" cy="1008112"/>
           </a:xfrm>
           <a:prstGeom prst="rect">
             <a:avLst/>
           </a:prstGeom>
+          <a:noFill/>
+          <a:ln w="9525">
+            <a:noFill/>
+            <a:miter lim="800000"/>
+            <a:headEnd/>
+            <a:tailEnd/>
+          </a:ln>
         </p:spPr>
       </p:pic>
       <p:pic>
         <p:nvPicPr>
-          <p:cNvPr id="7" name="Image 6" descr="logo-lyon1.png"/>
+          <p:cNvPr id="18433" name="Picture 1"/>
           <p:cNvPicPr>
-            <a:picLocks noChangeAspect="1"/>
+            <a:picLocks noChangeAspect="1" noChangeArrowheads="1"/>
           </p:cNvPicPr>
           <p:nvPr/>
         </p:nvPicPr>
         <p:blipFill>
           <a:blip r:embed="rId4" cstate="print"/>
+          <a:srcRect/>
           <a:stretch>
             <a:fillRect/>
           </a:stretch>
         </p:blipFill>
-        <p:spPr>
+        <p:spPr bwMode="auto">
           <a:xfrm>
-            <a:off x="4572000" y="116632"/>
-            <a:ext cx="2309614" cy="609129"/>
+            <a:off x="4611278" y="260648"/>
+            <a:ext cx="824818" cy="432048"/>
           </a:xfrm>
           <a:prstGeom prst="rect">
             <a:avLst/>
           </a:prstGeom>
+          <a:noFill/>
+          <a:ln w="9525">
+            <a:noFill/>
+            <a:miter lim="800000"/>
+            <a:headEnd/>
+            <a:tailEnd/>
+          </a:ln>
         </p:spPr>
       </p:pic>
       <p:pic>
         <p:nvPicPr>
-          <p:cNvPr id="15362" name="Picture 2"/>
+          <p:cNvPr id="18435" name="Picture 3"/>
           <p:cNvPicPr>
             <a:picLocks noChangeAspect="1" noChangeArrowheads="1"/>
           </p:cNvPicPr>
@@ -7978,8 +7651,8 @@
         </p:blipFill>
         <p:spPr bwMode="auto">
           <a:xfrm>
-            <a:off x="6660232" y="2996952"/>
-            <a:ext cx="2095500" cy="2095500"/>
+            <a:off x="6226449" y="188640"/>
+            <a:ext cx="649807" cy="521016"/>
           </a:xfrm>
           <a:prstGeom prst="rect">
             <a:avLst/>
@@ -7991,6 +7664,142 @@
             <a:headEnd/>
             <a:tailEnd/>
           </a:ln>
+        </p:spPr>
+      </p:pic>
+      <p:pic>
+        <p:nvPicPr>
+          <p:cNvPr id="18437" name="Picture 5" descr="https://www.ovh.com/fr/images/public-cloud-2013/pages/saas.jpg"/>
+          <p:cNvPicPr>
+            <a:picLocks noChangeAspect="1" noChangeArrowheads="1"/>
+          </p:cNvPicPr>
+          <p:nvPr/>
+        </p:nvPicPr>
+        <p:blipFill>
+          <a:blip r:embed="rId6" cstate="print"/>
+          <a:srcRect/>
+          <a:stretch>
+            <a:fillRect/>
+          </a:stretch>
+        </p:blipFill>
+        <p:spPr bwMode="auto">
+          <a:xfrm>
+            <a:off x="7812360" y="1196752"/>
+            <a:ext cx="792088" cy="469000"/>
+          </a:xfrm>
+          <a:prstGeom prst="rect">
+            <a:avLst/>
+          </a:prstGeom>
+          <a:noFill/>
+        </p:spPr>
+      </p:pic>
+      <p:pic>
+        <p:nvPicPr>
+          <p:cNvPr id="18438" name="Picture 6"/>
+          <p:cNvPicPr>
+            <a:picLocks noChangeAspect="1" noChangeArrowheads="1"/>
+          </p:cNvPicPr>
+          <p:nvPr/>
+        </p:nvPicPr>
+        <p:blipFill>
+          <a:blip r:embed="rId7" cstate="print"/>
+          <a:srcRect/>
+          <a:stretch>
+            <a:fillRect/>
+          </a:stretch>
+        </p:blipFill>
+        <p:spPr bwMode="auto">
+          <a:xfrm>
+            <a:off x="5479703" y="692696"/>
+            <a:ext cx="748481" cy="734251"/>
+          </a:xfrm>
+          <a:prstGeom prst="rect">
+            <a:avLst/>
+          </a:prstGeom>
+          <a:noFill/>
+          <a:ln w="9525">
+            <a:noFill/>
+            <a:miter lim="800000"/>
+            <a:headEnd/>
+            <a:tailEnd/>
+          </a:ln>
+        </p:spPr>
+      </p:pic>
+      <p:pic>
+        <p:nvPicPr>
+          <p:cNvPr id="18440" name="Picture 8" descr="http://www.iperiusbackup.net/wp-content/uploads/2014/11/amazon-s3-logo-150x118.png"/>
+          <p:cNvPicPr>
+            <a:picLocks noChangeAspect="1" noChangeArrowheads="1"/>
+          </p:cNvPicPr>
+          <p:nvPr/>
+        </p:nvPicPr>
+        <p:blipFill>
+          <a:blip r:embed="rId8" cstate="print"/>
+          <a:srcRect/>
+          <a:stretch>
+            <a:fillRect/>
+          </a:stretch>
+        </p:blipFill>
+        <p:spPr bwMode="auto">
+          <a:xfrm>
+            <a:off x="6804248" y="764704"/>
+            <a:ext cx="640749" cy="504056"/>
+          </a:xfrm>
+          <a:prstGeom prst="rect">
+            <a:avLst/>
+          </a:prstGeom>
+          <a:noFill/>
+        </p:spPr>
+      </p:pic>
+      <p:pic>
+        <p:nvPicPr>
+          <p:cNvPr id="18442" name="Picture 10" descr="https://www.educationquest.org/wp-content/uploads/2013/10/dropbox-logo-235x300.png"/>
+          <p:cNvPicPr>
+            <a:picLocks noChangeAspect="1" noChangeArrowheads="1"/>
+          </p:cNvPicPr>
+          <p:nvPr/>
+        </p:nvPicPr>
+        <p:blipFill>
+          <a:blip r:embed="rId9" cstate="print"/>
+          <a:srcRect/>
+          <a:stretch>
+            <a:fillRect/>
+          </a:stretch>
+        </p:blipFill>
+        <p:spPr bwMode="auto">
+          <a:xfrm>
+            <a:off x="7812360" y="188640"/>
+            <a:ext cx="504056" cy="643476"/>
+          </a:xfrm>
+          <a:prstGeom prst="rect">
+            <a:avLst/>
+          </a:prstGeom>
+          <a:noFill/>
+        </p:spPr>
+      </p:pic>
+      <p:pic>
+        <p:nvPicPr>
+          <p:cNvPr id="18444" name="Picture 12" descr="http://www.h3dwallpapers.com/wp-content/uploads/2014/09/Google_drive_logo-3.jpg"/>
+          <p:cNvPicPr>
+            <a:picLocks noChangeAspect="1" noChangeArrowheads="1"/>
+          </p:cNvPicPr>
+          <p:nvPr/>
+        </p:nvPicPr>
+        <p:blipFill>
+          <a:blip r:embed="rId10" cstate="print"/>
+          <a:srcRect/>
+          <a:stretch>
+            <a:fillRect/>
+          </a:stretch>
+        </p:blipFill>
+        <p:spPr bwMode="auto">
+          <a:xfrm>
+            <a:off x="4479725" y="908720"/>
+            <a:ext cx="812355" cy="812355"/>
+          </a:xfrm>
+          <a:prstGeom prst="rect">
+            <a:avLst/>
+          </a:prstGeom>
+          <a:noFill/>
         </p:spPr>
       </p:pic>
     </p:spTree>
@@ -8046,8 +7855,8 @@
               <a:buNone/>
             </a:pPr>
             <a:r>
-              <a:rPr lang="fr-FR" dirty="0" smtClean="0"/>
-              <a:t>B - Solutions existantes</a:t>
+              <a:rPr lang="fr-FR" b="1" dirty="0" smtClean="0"/>
+              <a:t>Solutions existantes</a:t>
             </a:r>
           </a:p>
           <a:p>
@@ -8098,7 +7907,7 @@
           <a:p>
             <a:r>
               <a:rPr lang="fr-FR" dirty="0" smtClean="0"/>
-              <a:t>Projet de </a:t>
+              <a:t>Projet </a:t>
             </a:r>
             <a:r>
               <a:rPr lang="fr-FR" dirty="0" err="1" smtClean="0"/>
@@ -8133,7 +7942,7 @@
           <a:p>
             <a:r>
               <a:rPr lang="fr-FR" dirty="0" smtClean="0"/>
-              <a:t>I - Recherche</a:t>
+              <a:t>Recherche</a:t>
             </a:r>
             <a:endParaRPr lang="fr-FR" dirty="0"/>
           </a:p>
@@ -8155,72 +7964,24 @@
           <a:lstStyle/>
           <a:p>
             <a:fld id="{BCF39854-5727-49C5-871A-2A9A28C6ADE3}" type="slidenum">
-              <a:rPr lang="fr-FR" smtClean="0"/>
+              <a:rPr lang="fr-FR" sz="1600" smtClean="0"/>
               <a:pPr/>
               <a:t>5</a:t>
             </a:fld>
-            <a:endParaRPr lang="fr-FR"/>
+            <a:endParaRPr lang="fr-FR" sz="1600" dirty="0"/>
           </a:p>
         </p:txBody>
       </p:sp>
       <p:pic>
         <p:nvPicPr>
-          <p:cNvPr id="6" name="Image 5" descr="logo-ens.png"/>
-          <p:cNvPicPr>
-            <a:picLocks noChangeAspect="1"/>
-          </p:cNvPicPr>
-          <p:nvPr/>
-        </p:nvPicPr>
-        <p:blipFill>
-          <a:blip r:embed="rId2" cstate="print"/>
-          <a:stretch>
-            <a:fillRect/>
-          </a:stretch>
-        </p:blipFill>
-        <p:spPr>
-          <a:xfrm>
-            <a:off x="7236296" y="188640"/>
-            <a:ext cx="1547664" cy="577812"/>
-          </a:xfrm>
-          <a:prstGeom prst="rect">
-            <a:avLst/>
-          </a:prstGeom>
-        </p:spPr>
-      </p:pic>
-      <p:pic>
-        <p:nvPicPr>
-          <p:cNvPr id="7" name="Image 6" descr="logo-lyon1.png"/>
-          <p:cNvPicPr>
-            <a:picLocks noChangeAspect="1"/>
-          </p:cNvPicPr>
-          <p:nvPr/>
-        </p:nvPicPr>
-        <p:blipFill>
-          <a:blip r:embed="rId3" cstate="print"/>
-          <a:stretch>
-            <a:fillRect/>
-          </a:stretch>
-        </p:blipFill>
-        <p:spPr>
-          <a:xfrm>
-            <a:off x="4572000" y="116632"/>
-            <a:ext cx="2309614" cy="609129"/>
-          </a:xfrm>
-          <a:prstGeom prst="rect">
-            <a:avLst/>
-          </a:prstGeom>
-        </p:spPr>
-      </p:pic>
-      <p:pic>
-        <p:nvPicPr>
-          <p:cNvPr id="13314" name="Picture 2" descr="https://sandrinemeldener.files.wordpress.com/2014/02/bonhomme-technique.jpg"/>
+          <p:cNvPr id="16386" name="Picture 2" descr="http://www.www8-hp.com/fr/fr/images/alm_pc_cloud_ss_tcm113_1624177_tcm113_1624174_tcm113-1624177.jpg"/>
           <p:cNvPicPr>
             <a:picLocks noChangeAspect="1" noChangeArrowheads="1"/>
           </p:cNvPicPr>
           <p:nvPr/>
         </p:nvPicPr>
         <p:blipFill>
-          <a:blip r:embed="rId4" cstate="print"/>
+          <a:blip r:embed="rId2" cstate="print"/>
           <a:srcRect/>
           <a:stretch>
             <a:fillRect/>
@@ -8228,8 +7989,8 @@
         </p:blipFill>
         <p:spPr bwMode="auto">
           <a:xfrm>
-            <a:off x="5436096" y="2276872"/>
-            <a:ext cx="2641476" cy="2641476"/>
+            <a:off x="3852104" y="548680"/>
+            <a:ext cx="5040376" cy="2523407"/>
           </a:xfrm>
           <a:prstGeom prst="rect">
             <a:avLst/>
@@ -8237,6 +7998,92 @@
           <a:noFill/>
         </p:spPr>
       </p:pic>
+      <p:sp>
+        <p:nvSpPr>
+          <p:cNvPr id="10" name="ZoneTexte 9"/>
+          <p:cNvSpPr txBox="1"/>
+          <p:nvPr/>
+        </p:nvSpPr>
+        <p:spPr>
+          <a:xfrm>
+            <a:off x="5796136" y="3068960"/>
+            <a:ext cx="1366080" cy="276999"/>
+          </a:xfrm>
+          <a:prstGeom prst="rect">
+            <a:avLst/>
+          </a:prstGeom>
+          <a:noFill/>
+        </p:spPr>
+        <p:txBody>
+          <a:bodyPr wrap="none" rtlCol="0">
+            <a:spAutoFit/>
+          </a:bodyPr>
+          <a:lstStyle/>
+          <a:p>
+            <a:r>
+              <a:rPr lang="fr-FR" sz="1200" dirty="0" smtClean="0"/>
+              <a:t>HP Performance</a:t>
+            </a:r>
+            <a:endParaRPr lang="fr-FR" sz="1200" dirty="0"/>
+          </a:p>
+        </p:txBody>
+      </p:sp>
+      <p:pic>
+        <p:nvPicPr>
+          <p:cNvPr id="16388" name="Picture 4" descr="http://i-cms.journaldunet.com/image_cms/original/1630158-cloudscreener-etend-son-comparateur-de-cloud-a-aruba.jpg"/>
+          <p:cNvPicPr>
+            <a:picLocks noChangeAspect="1" noChangeArrowheads="1"/>
+          </p:cNvPicPr>
+          <p:nvPr/>
+        </p:nvPicPr>
+        <p:blipFill>
+          <a:blip r:embed="rId3" cstate="print"/>
+          <a:srcRect/>
+          <a:stretch>
+            <a:fillRect/>
+          </a:stretch>
+        </p:blipFill>
+        <p:spPr bwMode="auto">
+          <a:xfrm>
+            <a:off x="4211960" y="3501008"/>
+            <a:ext cx="4896544" cy="2717583"/>
+          </a:xfrm>
+          <a:prstGeom prst="rect">
+            <a:avLst/>
+          </a:prstGeom>
+          <a:noFill/>
+        </p:spPr>
+      </p:pic>
+      <p:sp>
+        <p:nvSpPr>
+          <p:cNvPr id="12" name="ZoneTexte 11"/>
+          <p:cNvSpPr txBox="1"/>
+          <p:nvPr/>
+        </p:nvSpPr>
+        <p:spPr>
+          <a:xfrm>
+            <a:off x="5940152" y="6237312"/>
+            <a:ext cx="1260281" cy="276999"/>
+          </a:xfrm>
+          <a:prstGeom prst="rect">
+            <a:avLst/>
+          </a:prstGeom>
+          <a:noFill/>
+        </p:spPr>
+        <p:txBody>
+          <a:bodyPr wrap="none" rtlCol="0">
+            <a:spAutoFit/>
+          </a:bodyPr>
+          <a:lstStyle/>
+          <a:p>
+            <a:r>
+              <a:rPr lang="fr-FR" sz="1200" dirty="0" err="1" smtClean="0"/>
+              <a:t>CloudScreener</a:t>
+            </a:r>
+            <a:endParaRPr lang="fr-FR" sz="1200" dirty="0"/>
+          </a:p>
+        </p:txBody>
+      </p:sp>
     </p:spTree>
   </p:cSld>
   <p:clrMapOvr>
@@ -8288,9 +8135,10 @@
               <a:buNone/>
             </a:pPr>
             <a:r>
-              <a:rPr lang="fr-FR" dirty="0" smtClean="0"/>
-              <a:t>A - Modélisation</a:t>
-            </a:r>
+              <a:rPr lang="fr-FR" b="1" dirty="0" smtClean="0"/>
+              <a:t>Modélisation</a:t>
+            </a:r>
+            <a:endParaRPr lang="fr-FR" dirty="0" smtClean="0"/>
           </a:p>
           <a:p>
             <a:pPr>
@@ -8299,12 +8147,6 @@
             <a:endParaRPr lang="fr-FR" dirty="0" smtClean="0"/>
           </a:p>
           <a:p>
-            <a:pPr>
-              <a:buNone/>
-            </a:pPr>
-            <a:endParaRPr lang="fr-FR" dirty="0" smtClean="0"/>
-          </a:p>
-          <a:p>
             <a:r>
               <a:rPr lang="fr-FR" dirty="0" smtClean="0"/>
               <a:t>Choix des paramètres</a:t>
@@ -8314,10 +8156,30 @@
             <a:endParaRPr lang="fr-FR" dirty="0" smtClean="0"/>
           </a:p>
           <a:p>
+            <a:endParaRPr lang="fr-FR" dirty="0" smtClean="0"/>
+          </a:p>
+          <a:p>
             <a:r>
               <a:rPr lang="fr-FR" dirty="0" smtClean="0"/>
-              <a:t>Structure de données</a:t>
-            </a:r>
+              <a:t>Structure de </a:t>
+            </a:r>
+            <a:r>
+              <a:rPr lang="fr-FR" dirty="0" smtClean="0"/>
+              <a:t>données</a:t>
+            </a:r>
+          </a:p>
+          <a:p>
+            <a:endParaRPr lang="fr-FR" dirty="0" smtClean="0"/>
+          </a:p>
+          <a:p>
+            <a:endParaRPr lang="fr-FR" dirty="0" smtClean="0"/>
+          </a:p>
+          <a:p>
+            <a:r>
+              <a:rPr lang="fr-FR" dirty="0" smtClean="0"/>
+              <a:t>Protocole expérimental</a:t>
+            </a:r>
+            <a:endParaRPr lang="fr-FR" dirty="0" smtClean="0"/>
           </a:p>
           <a:p>
             <a:endParaRPr lang="fr-FR" dirty="0" smtClean="0"/>
@@ -8343,7 +8205,15 @@
           <a:p>
             <a:r>
               <a:rPr lang="fr-FR" dirty="0" smtClean="0"/>
-              <a:t>II - KYD</a:t>
+              <a:t>Know </a:t>
+            </a:r>
+            <a:r>
+              <a:rPr lang="fr-FR" dirty="0" err="1" smtClean="0"/>
+              <a:t>Your</a:t>
+            </a:r>
+            <a:r>
+              <a:rPr lang="fr-FR" dirty="0" smtClean="0"/>
+              <a:t> Data</a:t>
             </a:r>
             <a:endParaRPr lang="fr-FR" dirty="0"/>
           </a:p>
@@ -8365,62 +8235,14 @@
           <a:lstStyle/>
           <a:p>
             <a:fld id="{BCF39854-5727-49C5-871A-2A9A28C6ADE3}" type="slidenum">
-              <a:rPr lang="fr-FR" smtClean="0"/>
+              <a:rPr lang="fr-FR" sz="1600" smtClean="0"/>
               <a:pPr/>
               <a:t>6</a:t>
             </a:fld>
-            <a:endParaRPr lang="fr-FR"/>
-          </a:p>
-        </p:txBody>
-      </p:sp>
-      <p:pic>
-        <p:nvPicPr>
-          <p:cNvPr id="6" name="Image 5" descr="logo-ens.png"/>
-          <p:cNvPicPr>
-            <a:picLocks noChangeAspect="1"/>
-          </p:cNvPicPr>
-          <p:nvPr/>
-        </p:nvPicPr>
-        <p:blipFill>
-          <a:blip r:embed="rId2" cstate="print"/>
-          <a:stretch>
-            <a:fillRect/>
-          </a:stretch>
-        </p:blipFill>
-        <p:spPr>
-          <a:xfrm>
-            <a:off x="7236296" y="188640"/>
-            <a:ext cx="1547664" cy="577812"/>
-          </a:xfrm>
-          <a:prstGeom prst="rect">
-            <a:avLst/>
-          </a:prstGeom>
-        </p:spPr>
-      </p:pic>
-      <p:pic>
-        <p:nvPicPr>
-          <p:cNvPr id="7" name="Image 6" descr="logo-lyon1.png"/>
-          <p:cNvPicPr>
-            <a:picLocks noChangeAspect="1"/>
-          </p:cNvPicPr>
-          <p:nvPr/>
-        </p:nvPicPr>
-        <p:blipFill>
-          <a:blip r:embed="rId3" cstate="print"/>
-          <a:stretch>
-            <a:fillRect/>
-          </a:stretch>
-        </p:blipFill>
-        <p:spPr>
-          <a:xfrm>
-            <a:off x="4572000" y="116632"/>
-            <a:ext cx="2309614" cy="609129"/>
-          </a:xfrm>
-          <a:prstGeom prst="rect">
-            <a:avLst/>
-          </a:prstGeom>
-        </p:spPr>
-      </p:pic>
+            <a:endParaRPr lang="fr-FR" sz="1600"/>
+          </a:p>
+        </p:txBody>
+      </p:sp>
       <p:pic>
         <p:nvPicPr>
           <p:cNvPr id="12291" name="Picture 3"/>
@@ -8430,7 +8252,7 @@
           <p:nvPr/>
         </p:nvPicPr>
         <p:blipFill>
-          <a:blip r:embed="rId4" cstate="print"/>
+          <a:blip r:embed="rId2" cstate="print"/>
           <a:srcRect/>
           <a:stretch>
             <a:fillRect/>
@@ -8504,8 +8326,8 @@
               <a:buNone/>
             </a:pPr>
             <a:r>
-              <a:rPr lang="fr-FR" dirty="0" smtClean="0"/>
-              <a:t>B - Conception</a:t>
+              <a:rPr lang="fr-FR" b="1" dirty="0" smtClean="0"/>
+              <a:t>Conception</a:t>
             </a:r>
           </a:p>
           <a:p>
@@ -8582,7 +8404,15 @@
           <a:p>
             <a:r>
               <a:rPr lang="fr-FR" dirty="0" smtClean="0"/>
-              <a:t>II - KYD</a:t>
+              <a:t>Know </a:t>
+            </a:r>
+            <a:r>
+              <a:rPr lang="fr-FR" dirty="0" err="1" smtClean="0"/>
+              <a:t>Your</a:t>
+            </a:r>
+            <a:r>
+              <a:rPr lang="fr-FR" dirty="0" smtClean="0"/>
+              <a:t> Data</a:t>
             </a:r>
             <a:endParaRPr lang="fr-FR" dirty="0"/>
           </a:p>
@@ -8604,62 +8434,14 @@
           <a:lstStyle/>
           <a:p>
             <a:fld id="{BCF39854-5727-49C5-871A-2A9A28C6ADE3}" type="slidenum">
-              <a:rPr lang="fr-FR" smtClean="0"/>
+              <a:rPr lang="fr-FR" sz="1600" smtClean="0"/>
               <a:pPr/>
               <a:t>7</a:t>
             </a:fld>
-            <a:endParaRPr lang="fr-FR"/>
-          </a:p>
-        </p:txBody>
-      </p:sp>
-      <p:pic>
-        <p:nvPicPr>
-          <p:cNvPr id="6" name="Image 5" descr="logo-ens.png"/>
-          <p:cNvPicPr>
-            <a:picLocks noChangeAspect="1"/>
-          </p:cNvPicPr>
-          <p:nvPr/>
-        </p:nvPicPr>
-        <p:blipFill>
-          <a:blip r:embed="rId2" cstate="print"/>
-          <a:stretch>
-            <a:fillRect/>
-          </a:stretch>
-        </p:blipFill>
-        <p:spPr>
-          <a:xfrm>
-            <a:off x="7236296" y="188640"/>
-            <a:ext cx="1547664" cy="577812"/>
-          </a:xfrm>
-          <a:prstGeom prst="rect">
-            <a:avLst/>
-          </a:prstGeom>
-        </p:spPr>
-      </p:pic>
-      <p:pic>
-        <p:nvPicPr>
-          <p:cNvPr id="7" name="Image 6" descr="logo-lyon1.png"/>
-          <p:cNvPicPr>
-            <a:picLocks noChangeAspect="1"/>
-          </p:cNvPicPr>
-          <p:nvPr/>
-        </p:nvPicPr>
-        <p:blipFill>
-          <a:blip r:embed="rId3" cstate="print"/>
-          <a:stretch>
-            <a:fillRect/>
-          </a:stretch>
-        </p:blipFill>
-        <p:spPr>
-          <a:xfrm>
-            <a:off x="4572000" y="116632"/>
-            <a:ext cx="2309614" cy="609129"/>
-          </a:xfrm>
-          <a:prstGeom prst="rect">
-            <a:avLst/>
-          </a:prstGeom>
-        </p:spPr>
-      </p:pic>
+            <a:endParaRPr lang="fr-FR" sz="1600"/>
+          </a:p>
+        </p:txBody>
+      </p:sp>
       <p:pic>
         <p:nvPicPr>
           <p:cNvPr id="11266" name="Picture 2" descr="http://www.clg-fraissinet.ac-aix-marseille.fr/spip/local/cache-vignettes/L148xH309/chantier_bonhomme-0251e.gif"/>
@@ -8669,7 +8451,7 @@
           <p:nvPr/>
         </p:nvPicPr>
         <p:blipFill>
-          <a:blip r:embed="rId4" cstate="print"/>
+          <a:blip r:embed="rId2" cstate="print"/>
           <a:srcRect/>
           <a:stretch>
             <a:fillRect/>
@@ -8737,8 +8519,20 @@
               <a:buNone/>
             </a:pPr>
             <a:r>
+              <a:rPr lang="fr-FR" b="1" dirty="0" smtClean="0"/>
+              <a:t>Implémentation</a:t>
+            </a:r>
+          </a:p>
+          <a:p>
+            <a:pPr>
+              <a:buNone/>
+            </a:pPr>
+            <a:endParaRPr lang="fr-FR" b="1" dirty="0" smtClean="0"/>
+          </a:p>
+          <a:p>
+            <a:r>
               <a:rPr lang="fr-FR" dirty="0" smtClean="0"/>
-              <a:t>C - Implémentation</a:t>
+              <a:t>Modulaire</a:t>
             </a:r>
           </a:p>
           <a:p>
@@ -8759,17 +8553,20 @@
           <a:p>
             <a:r>
               <a:rPr lang="fr-FR" dirty="0" smtClean="0"/>
+              <a:t>2100 lignes de code</a:t>
+            </a:r>
+          </a:p>
+          <a:p>
+            <a:endParaRPr lang="fr-FR" dirty="0" smtClean="0"/>
+          </a:p>
+          <a:p>
+            <a:r>
+              <a:rPr lang="fr-FR" dirty="0" smtClean="0"/>
               <a:t>API et SDK</a:t>
             </a:r>
           </a:p>
           <a:p>
             <a:endParaRPr lang="fr-FR" dirty="0" smtClean="0"/>
-          </a:p>
-          <a:p>
-            <a:r>
-              <a:rPr lang="fr-FR" dirty="0" smtClean="0"/>
-              <a:t>Modulaire</a:t>
-            </a:r>
           </a:p>
         </p:txBody>
       </p:sp>
@@ -8792,7 +8589,15 @@
           <a:p>
             <a:r>
               <a:rPr lang="fr-FR" dirty="0" smtClean="0"/>
-              <a:t>II - KYD</a:t>
+              <a:t>Know </a:t>
+            </a:r>
+            <a:r>
+              <a:rPr lang="fr-FR" dirty="0" err="1" smtClean="0"/>
+              <a:t>Your</a:t>
+            </a:r>
+            <a:r>
+              <a:rPr lang="fr-FR" dirty="0" smtClean="0"/>
+              <a:t> Data</a:t>
             </a:r>
             <a:endParaRPr lang="fr-FR" dirty="0"/>
           </a:p>
@@ -8814,62 +8619,14 @@
           <a:lstStyle/>
           <a:p>
             <a:fld id="{BCF39854-5727-49C5-871A-2A9A28C6ADE3}" type="slidenum">
-              <a:rPr lang="fr-FR" smtClean="0"/>
+              <a:rPr lang="fr-FR" sz="1600" smtClean="0"/>
               <a:pPr/>
               <a:t>8</a:t>
             </a:fld>
-            <a:endParaRPr lang="fr-FR"/>
-          </a:p>
-        </p:txBody>
-      </p:sp>
-      <p:pic>
-        <p:nvPicPr>
-          <p:cNvPr id="6" name="Image 5" descr="logo-ens.png"/>
-          <p:cNvPicPr>
-            <a:picLocks noChangeAspect="1"/>
-          </p:cNvPicPr>
-          <p:nvPr/>
-        </p:nvPicPr>
-        <p:blipFill>
-          <a:blip r:embed="rId2" cstate="print"/>
-          <a:stretch>
-            <a:fillRect/>
-          </a:stretch>
-        </p:blipFill>
-        <p:spPr>
-          <a:xfrm>
-            <a:off x="7236296" y="188640"/>
-            <a:ext cx="1547664" cy="577812"/>
-          </a:xfrm>
-          <a:prstGeom prst="rect">
-            <a:avLst/>
-          </a:prstGeom>
-        </p:spPr>
-      </p:pic>
-      <p:pic>
-        <p:nvPicPr>
-          <p:cNvPr id="7" name="Image 6" descr="logo-lyon1.png"/>
-          <p:cNvPicPr>
-            <a:picLocks noChangeAspect="1"/>
-          </p:cNvPicPr>
-          <p:nvPr/>
-        </p:nvPicPr>
-        <p:blipFill>
-          <a:blip r:embed="rId3" cstate="print"/>
-          <a:stretch>
-            <a:fillRect/>
-          </a:stretch>
-        </p:blipFill>
-        <p:spPr>
-          <a:xfrm>
-            <a:off x="4572000" y="116632"/>
-            <a:ext cx="2309614" cy="609129"/>
-          </a:xfrm>
-          <a:prstGeom prst="rect">
-            <a:avLst/>
-          </a:prstGeom>
-        </p:spPr>
-      </p:pic>
+            <a:endParaRPr lang="fr-FR" sz="1600" dirty="0"/>
+          </a:p>
+        </p:txBody>
+      </p:sp>
       <p:pic>
         <p:nvPicPr>
           <p:cNvPr id="1026" name="Picture 2"/>
@@ -8879,7 +8636,7 @@
           <p:nvPr/>
         </p:nvPicPr>
         <p:blipFill>
-          <a:blip r:embed="rId4" cstate="print"/>
+          <a:blip r:embed="rId2" cstate="print"/>
           <a:srcRect/>
           <a:stretch>
             <a:fillRect/>
@@ -8953,48 +8710,17 @@
               <a:buNone/>
             </a:pPr>
             <a:r>
-              <a:rPr lang="fr-FR" dirty="0" smtClean="0"/>
-              <a:t>La </a:t>
-            </a:r>
-            <a:r>
-              <a:rPr lang="fr-FR" dirty="0" err="1" smtClean="0"/>
-              <a:t>Doua</a:t>
-            </a:r>
-            <a:r>
-              <a:rPr lang="fr-FR" dirty="0" smtClean="0"/>
-              <a:t> Lyon 1</a:t>
-            </a:r>
-          </a:p>
-          <a:p>
-            <a:endParaRPr lang="fr-FR" dirty="0" smtClean="0"/>
-          </a:p>
-          <a:p>
-            <a:r>
-              <a:rPr lang="fr-FR" dirty="0" smtClean="0"/>
-              <a:t>Upload</a:t>
-            </a:r>
-          </a:p>
-          <a:p>
-            <a:endParaRPr lang="fr-FR" dirty="0" smtClean="0"/>
-          </a:p>
-          <a:p>
-            <a:pPr>
-              <a:buNone/>
-            </a:pPr>
-            <a:endParaRPr lang="fr-FR" dirty="0" smtClean="0"/>
-          </a:p>
-          <a:p>
-            <a:endParaRPr lang="fr-FR" dirty="0" smtClean="0"/>
-          </a:p>
-          <a:p>
-            <a:endParaRPr lang="fr-FR" dirty="0" smtClean="0"/>
-          </a:p>
-          <a:p>
-            <a:r>
-              <a:rPr lang="fr-FR" dirty="0" smtClean="0"/>
-              <a:t>Download</a:t>
-            </a:r>
-            <a:endParaRPr lang="fr-FR" dirty="0"/>
+              <a:rPr lang="fr-FR" b="1" dirty="0" smtClean="0"/>
+              <a:t>Londres dimanche en </a:t>
+            </a:r>
+            <a:r>
+              <a:rPr lang="fr-FR" b="1" i="1" dirty="0" smtClean="0"/>
+              <a:t>upload </a:t>
+            </a:r>
+            <a:r>
+              <a:rPr lang="fr-FR" b="1" dirty="0" smtClean="0"/>
+              <a:t>de 10Mo</a:t>
+            </a:r>
           </a:p>
         </p:txBody>
       </p:sp>
@@ -9017,7 +8743,7 @@
           <a:p>
             <a:r>
               <a:rPr lang="fr-FR" dirty="0" smtClean="0"/>
-              <a:t>III - Analyse</a:t>
+              <a:t>Analyse</a:t>
             </a:r>
             <a:endParaRPr lang="fr-FR" dirty="0"/>
           </a:p>
@@ -9039,72 +8765,24 @@
           <a:lstStyle/>
           <a:p>
             <a:fld id="{BCF39854-5727-49C5-871A-2A9A28C6ADE3}" type="slidenum">
-              <a:rPr lang="fr-FR" smtClean="0"/>
+              <a:rPr lang="fr-FR" sz="1600" smtClean="0"/>
               <a:pPr/>
               <a:t>9</a:t>
             </a:fld>
-            <a:endParaRPr lang="fr-FR"/>
+            <a:endParaRPr lang="fr-FR" sz="1600" dirty="0"/>
           </a:p>
         </p:txBody>
       </p:sp>
       <p:pic>
         <p:nvPicPr>
-          <p:cNvPr id="6" name="Image 5" descr="logo-ens.png"/>
-          <p:cNvPicPr>
-            <a:picLocks noChangeAspect="1"/>
-          </p:cNvPicPr>
-          <p:nvPr/>
-        </p:nvPicPr>
-        <p:blipFill>
-          <a:blip r:embed="rId2" cstate="print"/>
-          <a:stretch>
-            <a:fillRect/>
-          </a:stretch>
-        </p:blipFill>
-        <p:spPr>
-          <a:xfrm>
-            <a:off x="7236296" y="188640"/>
-            <a:ext cx="1547664" cy="577812"/>
-          </a:xfrm>
-          <a:prstGeom prst="rect">
-            <a:avLst/>
-          </a:prstGeom>
-        </p:spPr>
-      </p:pic>
-      <p:pic>
-        <p:nvPicPr>
-          <p:cNvPr id="7" name="Image 6" descr="logo-lyon1.png"/>
-          <p:cNvPicPr>
-            <a:picLocks noChangeAspect="1"/>
-          </p:cNvPicPr>
-          <p:nvPr/>
-        </p:nvPicPr>
-        <p:blipFill>
-          <a:blip r:embed="rId3" cstate="print"/>
-          <a:stretch>
-            <a:fillRect/>
-          </a:stretch>
-        </p:blipFill>
-        <p:spPr>
-          <a:xfrm>
-            <a:off x="4572000" y="116632"/>
-            <a:ext cx="2309614" cy="609129"/>
-          </a:xfrm>
-          <a:prstGeom prst="rect">
-            <a:avLst/>
-          </a:prstGeom>
-        </p:spPr>
-      </p:pic>
-      <p:pic>
-        <p:nvPicPr>
-          <p:cNvPr id="2051" name="Picture 3"/>
+          <p:cNvPr id="11" name="Picture 2"/>
           <p:cNvPicPr>
             <a:picLocks noChangeAspect="1" noChangeArrowheads="1"/>
           </p:cNvPicPr>
           <p:nvPr/>
         </p:nvPicPr>
         <p:blipFill>
-          <a:blip r:embed="rId4" cstate="print"/>
+          <a:blip r:embed="rId2" cstate="print"/>
           <a:srcRect/>
           <a:stretch>
             <a:fillRect/>
@@ -9112,40 +8790,8 @@
         </p:blipFill>
         <p:spPr bwMode="auto">
           <a:xfrm>
-            <a:off x="3160565" y="1052736"/>
-            <a:ext cx="5546417" cy="2808312"/>
-          </a:xfrm>
-          <a:prstGeom prst="rect">
-            <a:avLst/>
-          </a:prstGeom>
-          <a:noFill/>
-          <a:ln w="9525">
-            <a:noFill/>
-            <a:miter lim="800000"/>
-            <a:headEnd/>
-            <a:tailEnd/>
-          </a:ln>
-        </p:spPr>
-      </p:pic>
-      <p:pic>
-        <p:nvPicPr>
-          <p:cNvPr id="2052" name="Picture 4"/>
-          <p:cNvPicPr>
-            <a:picLocks noChangeAspect="1" noChangeArrowheads="1"/>
-          </p:cNvPicPr>
-          <p:nvPr/>
-        </p:nvPicPr>
-        <p:blipFill>
-          <a:blip r:embed="rId5" cstate="print"/>
-          <a:srcRect/>
-          <a:stretch>
-            <a:fillRect/>
-          </a:stretch>
-        </p:blipFill>
-        <p:spPr bwMode="auto">
-          <a:xfrm>
-            <a:off x="3131840" y="3713386"/>
-            <a:ext cx="5411402" cy="2739950"/>
+            <a:off x="107504" y="2276871"/>
+            <a:ext cx="8897916" cy="3394787"/>
           </a:xfrm>
           <a:prstGeom prst="rect">
             <a:avLst/>

</xml_diff>

<commit_message>
modif du powerpoint apres presentation blanche
</commit_message>
<xml_diff>
--- a/docs/TER.pptx
+++ b/docs/TER.pptx
@@ -5,10 +5,10 @@
     <p:sldMasterId id="2147483660" r:id="rId1"/>
   </p:sldMasterIdLst>
   <p:notesMasterIdLst>
-    <p:notesMasterId r:id="rId18"/>
+    <p:notesMasterId r:id="rId16"/>
   </p:notesMasterIdLst>
   <p:handoutMasterIdLst>
-    <p:handoutMasterId r:id="rId19"/>
+    <p:handoutMasterId r:id="rId17"/>
   </p:handoutMasterIdLst>
   <p:sldIdLst>
     <p:sldId id="256" r:id="rId2"/>
@@ -21,12 +21,10 @@
     <p:sldId id="271" r:id="rId9"/>
     <p:sldId id="269" r:id="rId10"/>
     <p:sldId id="276" r:id="rId11"/>
-    <p:sldId id="264" r:id="rId12"/>
-    <p:sldId id="267" r:id="rId13"/>
-    <p:sldId id="273" r:id="rId14"/>
-    <p:sldId id="274" r:id="rId15"/>
-    <p:sldId id="275" r:id="rId16"/>
-    <p:sldId id="263" r:id="rId17"/>
+    <p:sldId id="277" r:id="rId12"/>
+    <p:sldId id="264" r:id="rId13"/>
+    <p:sldId id="274" r:id="rId14"/>
+    <p:sldId id="263" r:id="rId15"/>
   </p:sldIdLst>
   <p:sldSz cx="9144000" cy="6858000" type="screen4x3"/>
   <p:notesSz cx="6858000" cy="9144000"/>
@@ -211,7 +209,7 @@
             <a:fld id="{E87BFDE2-5D33-45EB-9390-32225B2E8CBA}" type="datetimeFigureOut">
               <a:rPr lang="fr-FR" smtClean="0"/>
               <a:pPr/>
-              <a:t>25/02/2015</a:t>
+              <a:t>26/02/2015</a:t>
             </a:fld>
             <a:endParaRPr lang="fr-FR"/>
           </a:p>
@@ -373,7 +371,7 @@
             <a:fld id="{72063E4F-4A18-463B-88F9-D61737674A47}" type="datetimeFigureOut">
               <a:rPr lang="fr-FR" smtClean="0"/>
               <a:pPr/>
-              <a:t>25/02/2015</a:t>
+              <a:t>26/02/2015</a:t>
             </a:fld>
             <a:endParaRPr lang="fr-FR"/>
           </a:p>
@@ -1045,7 +1043,11 @@
           </a:bodyPr>
           <a:lstStyle/>
           <a:p>
-            <a:endParaRPr lang="fr-FR"/>
+            <a:r>
+              <a:rPr lang="fr-FR" dirty="0" smtClean="0"/>
+              <a:t>Différence de temps pour la même taille de fichier entre Lyon et Londres</a:t>
+            </a:r>
+            <a:endParaRPr lang="fr-FR" dirty="0"/>
           </a:p>
         </p:txBody>
       </p:sp>
@@ -1068,6 +1070,88 @@
               <a:rPr lang="fr-FR" smtClean="0"/>
               <a:pPr/>
               <a:t>11</a:t>
+            </a:fld>
+            <a:endParaRPr lang="fr-FR"/>
+          </a:p>
+        </p:txBody>
+      </p:sp>
+    </p:spTree>
+  </p:cSld>
+  <p:clrMapOvr>
+    <a:masterClrMapping/>
+  </p:clrMapOvr>
+</p:notes>
+</file>
+
+<file path=ppt/notesSlides/notesSlide6.xml><?xml version="1.0" encoding="utf-8"?>
+<p:notes xmlns:a="http://schemas.openxmlformats.org/drawingml/2006/main" xmlns:r="http://schemas.openxmlformats.org/officeDocument/2006/relationships" xmlns:p="http://schemas.openxmlformats.org/presentationml/2006/main">
+  <p:cSld>
+    <p:spTree>
+      <p:nvGrpSpPr>
+        <p:cNvPr id="1" name=""/>
+        <p:cNvGrpSpPr/>
+        <p:nvPr/>
+      </p:nvGrpSpPr>
+      <p:grpSpPr>
+        <a:xfrm>
+          <a:off x="0" y="0"/>
+          <a:ext cx="0" cy="0"/>
+          <a:chOff x="0" y="0"/>
+          <a:chExt cx="0" cy="0"/>
+        </a:xfrm>
+      </p:grpSpPr>
+      <p:sp>
+        <p:nvSpPr>
+          <p:cNvPr id="2" name="Espace réservé de l'image des diapositives 1"/>
+          <p:cNvSpPr>
+            <a:spLocks noGrp="1" noRot="1" noChangeAspect="1"/>
+          </p:cNvSpPr>
+          <p:nvPr>
+            <p:ph type="sldImg"/>
+          </p:nvPr>
+        </p:nvSpPr>
+        <p:spPr/>
+      </p:sp>
+      <p:sp>
+        <p:nvSpPr>
+          <p:cNvPr id="3" name="Espace réservé des commentaires 2"/>
+          <p:cNvSpPr>
+            <a:spLocks noGrp="1"/>
+          </p:cNvSpPr>
+          <p:nvPr>
+            <p:ph type="body" idx="1"/>
+          </p:nvPr>
+        </p:nvSpPr>
+        <p:spPr/>
+        <p:txBody>
+          <a:bodyPr>
+            <a:normAutofit/>
+          </a:bodyPr>
+          <a:lstStyle/>
+          <a:p>
+            <a:endParaRPr lang="fr-FR"/>
+          </a:p>
+        </p:txBody>
+      </p:sp>
+      <p:sp>
+        <p:nvSpPr>
+          <p:cNvPr id="4" name="Espace réservé du numéro de diapositive 3"/>
+          <p:cNvSpPr>
+            <a:spLocks noGrp="1"/>
+          </p:cNvSpPr>
+          <p:nvPr>
+            <p:ph type="sldNum" sz="quarter" idx="10"/>
+          </p:nvPr>
+        </p:nvSpPr>
+        <p:spPr/>
+        <p:txBody>
+          <a:bodyPr/>
+          <a:lstStyle/>
+          <a:p>
+            <a:fld id="{D6CC4C87-8BD4-4D4D-ADB5-ED6F2034EAD5}" type="slidenum">
+              <a:rPr lang="fr-FR" smtClean="0"/>
+              <a:pPr/>
+              <a:t>12</a:t>
             </a:fld>
             <a:endParaRPr lang="fr-FR"/>
           </a:p>
@@ -1707,7 +1791,7 @@
             <a:fld id="{99048350-1B02-48C4-A98A-3D7A872AF1D1}" type="datetime1">
               <a:rPr lang="fr-FR" smtClean="0"/>
               <a:pPr/>
-              <a:t>25/02/2015</a:t>
+              <a:t>26/02/2015</a:t>
             </a:fld>
             <a:endParaRPr lang="fr-FR"/>
           </a:p>
@@ -1905,7 +1989,7 @@
             <a:fld id="{ED96D579-57A8-4A41-A842-9926A6D73BE1}" type="datetime1">
               <a:rPr lang="fr-FR" smtClean="0"/>
               <a:pPr/>
-              <a:t>25/02/2015</a:t>
+              <a:t>26/02/2015</a:t>
             </a:fld>
             <a:endParaRPr lang="fr-FR"/>
           </a:p>
@@ -2092,7 +2176,7 @@
             <a:fld id="{288D761B-1F2C-4D56-81FC-28F945B92715}" type="datetime1">
               <a:rPr lang="fr-FR" smtClean="0"/>
               <a:pPr/>
-              <a:t>25/02/2015</a:t>
+              <a:t>26/02/2015</a:t>
             </a:fld>
             <a:endParaRPr lang="fr-FR"/>
           </a:p>
@@ -2244,7 +2328,7 @@
             <a:fld id="{39DA2AF2-0C83-41E7-B696-3923B2502827}" type="datetime1">
               <a:rPr lang="fr-FR" smtClean="0"/>
               <a:pPr/>
-              <a:t>25/02/2015</a:t>
+              <a:t>26/02/2015</a:t>
             </a:fld>
             <a:endParaRPr lang="fr-FR"/>
           </a:p>
@@ -2501,7 +2585,7 @@
             <a:fld id="{4D34A6BE-FCB7-49C4-BDCB-E77C944E14B9}" type="datetime1">
               <a:rPr lang="fr-FR" smtClean="0"/>
               <a:pPr/>
-              <a:t>25/02/2015</a:t>
+              <a:t>26/02/2015</a:t>
             </a:fld>
             <a:endParaRPr lang="fr-FR"/>
           </a:p>
@@ -2912,7 +2996,7 @@
             <a:fld id="{F4524890-ECC2-4BF2-9043-451E7FECC140}" type="datetime1">
               <a:rPr lang="fr-FR" smtClean="0"/>
               <a:pPr/>
-              <a:t>25/02/2015</a:t>
+              <a:t>26/02/2015</a:t>
             </a:fld>
             <a:endParaRPr lang="fr-FR"/>
           </a:p>
@@ -3360,7 +3444,7 @@
             <a:fld id="{40D1A748-EB92-4FC1-A495-3CCEC12F7A31}" type="datetime1">
               <a:rPr lang="fr-FR" smtClean="0"/>
               <a:pPr/>
-              <a:t>25/02/2015</a:t>
+              <a:t>26/02/2015</a:t>
             </a:fld>
             <a:endParaRPr lang="fr-FR"/>
           </a:p>
@@ -3463,7 +3547,7 @@
             <a:fld id="{0C141721-0F61-4D00-BAF3-51B2068434DA}" type="datetime1">
               <a:rPr lang="fr-FR" smtClean="0"/>
               <a:pPr/>
-              <a:t>25/02/2015</a:t>
+              <a:t>26/02/2015</a:t>
             </a:fld>
             <a:endParaRPr lang="fr-FR"/>
           </a:p>
@@ -3586,7 +3670,7 @@
             <a:fld id="{1BB9892A-00B0-4581-9A7F-F45CB9E5A018}" type="datetime1">
               <a:rPr lang="fr-FR" smtClean="0"/>
               <a:pPr/>
-              <a:t>25/02/2015</a:t>
+              <a:t>26/02/2015</a:t>
             </a:fld>
             <a:endParaRPr lang="fr-FR"/>
           </a:p>
@@ -3862,7 +3946,7 @@
             <a:fld id="{67AACC24-B37A-4D09-9CDF-FDE56DD7997B}" type="datetime1">
               <a:rPr lang="fr-FR" smtClean="0"/>
               <a:pPr/>
-              <a:t>25/02/2015</a:t>
+              <a:t>26/02/2015</a:t>
             </a:fld>
             <a:endParaRPr lang="fr-FR"/>
           </a:p>
@@ -4069,7 +4153,7 @@
             <a:fld id="{B1704885-383D-47AC-BAE4-A432D9508D81}" type="datetime1">
               <a:rPr lang="fr-FR" smtClean="0"/>
               <a:pPr/>
-              <a:t>25/02/2015</a:t>
+              <a:t>26/02/2015</a:t>
             </a:fld>
             <a:endParaRPr lang="fr-FR"/>
           </a:p>
@@ -5180,7 +5264,7 @@
             <a:fld id="{D3BAC3D6-7914-4F7A-9FA2-FD590B71F5F3}" type="datetime1">
               <a:rPr lang="fr-FR" smtClean="0"/>
               <a:pPr/>
-              <a:t>25/02/2015</a:t>
+              <a:t>26/02/2015</a:t>
             </a:fld>
             <a:endParaRPr lang="fr-FR"/>
           </a:p>
@@ -5646,20 +5730,8 @@
           </a:p>
           <a:p>
             <a:r>
-              <a:rPr lang="fr-FR" sz="2000" dirty="0" err="1" smtClean="0"/>
-              <a:t>Encadrants</a:t>
-            </a:r>
-            <a:r>
               <a:rPr lang="fr-FR" sz="2000" dirty="0" smtClean="0"/>
-              <a:t> : Yves </a:t>
-            </a:r>
-            <a:r>
-              <a:rPr lang="fr-FR" sz="2000" dirty="0" err="1" smtClean="0"/>
-              <a:t>Caniou</a:t>
-            </a:r>
-            <a:r>
-              <a:rPr lang="fr-FR" sz="2000" dirty="0" smtClean="0"/>
-              <a:t> &amp; Eddy Caron</a:t>
+              <a:t>Encadrants : Yves Caniou &amp; Eddy Caron</a:t>
             </a:r>
           </a:p>
           <a:p>
@@ -5795,62 +5867,23 @@
             </a:pPr>
             <a:r>
               <a:rPr lang="fr-FR" b="1" dirty="0" smtClean="0"/>
-              <a:t>Download</a:t>
-            </a:r>
-          </a:p>
-          <a:p>
-            <a:pPr>
-              <a:buNone/>
-            </a:pPr>
-            <a:endParaRPr lang="fr-FR" b="1" dirty="0" smtClean="0"/>
-          </a:p>
-          <a:p>
-            <a:r>
-              <a:rPr lang="fr-FR" dirty="0" smtClean="0"/>
-              <a:t>La </a:t>
-            </a:r>
-            <a:r>
-              <a:rPr lang="fr-FR" dirty="0" err="1" smtClean="0"/>
-              <a:t>Doua</a:t>
-            </a:r>
-            <a:r>
-              <a:rPr lang="fr-FR" dirty="0" smtClean="0"/>
-              <a:t> </a:t>
-            </a:r>
-          </a:p>
-          <a:p>
-            <a:pPr>
-              <a:buNone/>
-            </a:pPr>
-            <a:r>
-              <a:rPr lang="fr-FR" dirty="0" smtClean="0"/>
-              <a:t>  Lyon 1</a:t>
+              <a:t>Londres dimanche en </a:t>
+            </a:r>
+            <a:r>
+              <a:rPr lang="fr-FR" b="1" i="1" dirty="0" smtClean="0"/>
+              <a:t>download </a:t>
+            </a:r>
+            <a:r>
+              <a:rPr lang="fr-FR" b="1" dirty="0" smtClean="0"/>
+              <a:t>de </a:t>
+            </a:r>
+            <a:r>
+              <a:rPr lang="fr-FR" b="1" dirty="0" smtClean="0"/>
+              <a:t>10Mo</a:t>
             </a:r>
           </a:p>
           <a:p>
             <a:endParaRPr lang="fr-FR" dirty="0" smtClean="0"/>
-          </a:p>
-          <a:p>
-            <a:endParaRPr lang="fr-FR" dirty="0" smtClean="0"/>
-          </a:p>
-          <a:p>
-            <a:endParaRPr lang="fr-FR" dirty="0" smtClean="0"/>
-          </a:p>
-          <a:p>
-            <a:r>
-              <a:rPr lang="fr-FR" dirty="0" smtClean="0"/>
-              <a:t>Londres</a:t>
-            </a:r>
-          </a:p>
-          <a:p>
-            <a:pPr>
-              <a:buNone/>
-            </a:pPr>
-            <a:r>
-              <a:rPr lang="fr-FR" dirty="0" smtClean="0"/>
-              <a:t>  10Mo</a:t>
-            </a:r>
-            <a:endParaRPr lang="fr-FR" dirty="0"/>
           </a:p>
         </p:txBody>
       </p:sp>
@@ -5910,7 +5943,7 @@
       </p:sp>
       <p:pic>
         <p:nvPicPr>
-          <p:cNvPr id="1026" name="Picture 2"/>
+          <p:cNvPr id="3074" name="Picture 2"/>
           <p:cNvPicPr>
             <a:picLocks noChangeAspect="1" noChangeArrowheads="1"/>
           </p:cNvPicPr>
@@ -5925,40 +5958,8 @@
         </p:blipFill>
         <p:spPr bwMode="auto">
           <a:xfrm>
-            <a:off x="2654944" y="1340768"/>
-            <a:ext cx="6489056" cy="2475745"/>
-          </a:xfrm>
-          <a:prstGeom prst="rect">
-            <a:avLst/>
-          </a:prstGeom>
-          <a:noFill/>
-          <a:ln w="9525">
-            <a:noFill/>
-            <a:miter lim="800000"/>
-            <a:headEnd/>
-            <a:tailEnd/>
-          </a:ln>
-        </p:spPr>
-      </p:pic>
-      <p:pic>
-        <p:nvPicPr>
-          <p:cNvPr id="7" name="Picture 3"/>
-          <p:cNvPicPr>
-            <a:picLocks noChangeAspect="1" noChangeArrowheads="1"/>
-          </p:cNvPicPr>
-          <p:nvPr/>
-        </p:nvPicPr>
-        <p:blipFill>
-          <a:blip r:embed="rId4" cstate="print"/>
-          <a:srcRect/>
-          <a:stretch>
-            <a:fillRect/>
-          </a:stretch>
-        </p:blipFill>
-        <p:spPr bwMode="auto">
-          <a:xfrm>
-            <a:off x="2627784" y="3861048"/>
-            <a:ext cx="6516216" cy="2486106"/>
+            <a:off x="76200" y="2204864"/>
+            <a:ext cx="8991600" cy="3438525"/>
           </a:xfrm>
           <a:prstGeom prst="rect">
             <a:avLst/>
@@ -6024,60 +6025,40 @@
             </a:pPr>
             <a:r>
               <a:rPr lang="fr-FR" b="1" dirty="0" smtClean="0"/>
-              <a:t>Bilan professionnel</a:t>
-            </a:r>
-          </a:p>
-          <a:p>
-            <a:pPr>
-              <a:buNone/>
-            </a:pPr>
-            <a:endParaRPr lang="fr-FR" dirty="0" smtClean="0"/>
-          </a:p>
+              <a:t>La Doua Lyon 1 dimanche </a:t>
+            </a:r>
+            <a:r>
+              <a:rPr lang="fr-FR" b="1" dirty="0" smtClean="0"/>
+              <a:t>en </a:t>
+            </a:r>
+            <a:r>
+              <a:rPr lang="fr-FR" b="1" i="1" dirty="0" smtClean="0"/>
+              <a:t>download</a:t>
+            </a:r>
+            <a:endParaRPr lang="fr-FR" b="1" dirty="0" smtClean="0"/>
+          </a:p>
+        </p:txBody>
+      </p:sp>
+      <p:sp>
+        <p:nvSpPr>
+          <p:cNvPr id="3" name="Titre 2"/>
+          <p:cNvSpPr>
+            <a:spLocks noGrp="1"/>
+          </p:cNvSpPr>
+          <p:nvPr>
+            <p:ph type="title"/>
+          </p:nvPr>
+        </p:nvSpPr>
+        <p:spPr/>
+        <p:txBody>
+          <a:bodyPr>
+            <a:normAutofit/>
+          </a:bodyPr>
+          <a:lstStyle/>
           <a:p>
             <a:r>
               <a:rPr lang="fr-FR" dirty="0" smtClean="0"/>
-              <a:t>Le projet</a:t>
-            </a:r>
-          </a:p>
-          <a:p>
-            <a:endParaRPr lang="fr-FR" dirty="0" smtClean="0"/>
-          </a:p>
-          <a:p>
-            <a:r>
-              <a:rPr lang="fr-FR" dirty="0" smtClean="0"/>
-              <a:t>L’objectif</a:t>
-            </a:r>
-          </a:p>
-          <a:p>
-            <a:endParaRPr lang="fr-FR" dirty="0" smtClean="0"/>
-          </a:p>
-          <a:p>
-            <a:r>
-              <a:rPr lang="fr-FR" dirty="0" smtClean="0"/>
-              <a:t>Les contraintes</a:t>
-            </a:r>
-            <a:endParaRPr lang="fr-FR" dirty="0"/>
-          </a:p>
-        </p:txBody>
-      </p:sp>
-      <p:sp>
-        <p:nvSpPr>
-          <p:cNvPr id="3" name="Titre 2"/>
-          <p:cNvSpPr>
-            <a:spLocks noGrp="1"/>
-          </p:cNvSpPr>
-          <p:nvPr>
-            <p:ph type="title"/>
-          </p:nvPr>
-        </p:nvSpPr>
-        <p:spPr/>
-        <p:txBody>
-          <a:bodyPr/>
-          <a:lstStyle/>
-          <a:p>
-            <a:r>
-              <a:rPr lang="fr-FR" dirty="0" smtClean="0"/>
-              <a:t>Bilan</a:t>
+              <a:t>Analyse</a:t>
             </a:r>
             <a:endParaRPr lang="fr-FR" dirty="0"/>
           </a:p>
@@ -6114,7 +6095,7 @@
       </p:sp>
       <p:pic>
         <p:nvPicPr>
-          <p:cNvPr id="10242" name="Picture 2" descr="http://www.belor.be/images/peb_V.jpg"/>
+          <p:cNvPr id="4098" name="Picture 2"/>
           <p:cNvPicPr>
             <a:picLocks noChangeAspect="1" noChangeArrowheads="1"/>
           </p:cNvPicPr>
@@ -6129,13 +6110,19 @@
         </p:blipFill>
         <p:spPr bwMode="auto">
           <a:xfrm>
-            <a:off x="5148064" y="1916832"/>
-            <a:ext cx="3295650" cy="3295651"/>
+            <a:off x="33338" y="2184623"/>
+            <a:ext cx="9077325" cy="3476625"/>
           </a:xfrm>
           <a:prstGeom prst="rect">
             <a:avLst/>
           </a:prstGeom>
           <a:noFill/>
+          <a:ln w="9525">
+            <a:noFill/>
+            <a:miter lim="800000"/>
+            <a:headEnd/>
+            <a:tailEnd/>
+          </a:ln>
         </p:spPr>
       </p:pic>
     </p:spTree>
@@ -6185,44 +6172,78 @@
           <a:bodyPr/>
           <a:lstStyle/>
           <a:p>
-            <a:pPr>
-              <a:buNone/>
+            <a:endParaRPr lang="fr-FR" dirty="0" smtClean="0"/>
+          </a:p>
+          <a:p>
+            <a:r>
+              <a:rPr lang="fr-FR" dirty="0" smtClean="0"/>
+              <a:t>Bilan professionnel</a:t>
+            </a:r>
+          </a:p>
+          <a:p>
+            <a:pPr lvl="1">
+              <a:buFont typeface="Arial" pitchFamily="34" charset="0"/>
+              <a:buChar char="•"/>
             </a:pPr>
             <a:r>
-              <a:rPr lang="fr-FR" b="1" dirty="0" smtClean="0"/>
+              <a:rPr lang="fr-FR" dirty="0" smtClean="0"/>
+              <a:t>Le projet</a:t>
+            </a:r>
+            <a:r>
+              <a:rPr lang="fr-FR" dirty="0" smtClean="0"/>
+              <a:t>, </a:t>
+            </a:r>
+            <a:r>
+              <a:rPr lang="fr-FR" dirty="0" smtClean="0"/>
+              <a:t>l’objectif, les </a:t>
+            </a:r>
+            <a:r>
+              <a:rPr lang="fr-FR" dirty="0" smtClean="0"/>
+              <a:t>contraintes</a:t>
+            </a:r>
+          </a:p>
+          <a:p>
+            <a:pPr lvl="1"/>
+            <a:endParaRPr lang="fr-FR" dirty="0" smtClean="0"/>
+          </a:p>
+          <a:p>
+            <a:r>
+              <a:rPr lang="fr-FR" dirty="0" smtClean="0"/>
               <a:t>Bilan de recherche</a:t>
             </a:r>
           </a:p>
           <a:p>
-            <a:pPr>
-              <a:buNone/>
+            <a:pPr lvl="1">
+              <a:buFont typeface="Arial" pitchFamily="34" charset="0"/>
+              <a:buChar char="•"/>
+            </a:pPr>
+            <a:r>
+              <a:rPr lang="fr-FR" dirty="0" smtClean="0"/>
+              <a:t>S’informer, analyser, déduire</a:t>
+            </a:r>
+          </a:p>
+          <a:p>
+            <a:pPr lvl="1">
+              <a:buFont typeface="Arial" pitchFamily="34" charset="0"/>
+              <a:buChar char="•"/>
             </a:pPr>
             <a:endParaRPr lang="fr-FR" dirty="0" smtClean="0"/>
           </a:p>
           <a:p>
             <a:r>
               <a:rPr lang="fr-FR" dirty="0" smtClean="0"/>
-              <a:t>S’informer</a:t>
-            </a:r>
-          </a:p>
-          <a:p>
-            <a:endParaRPr lang="fr-FR" dirty="0" smtClean="0"/>
-          </a:p>
-          <a:p>
+              <a:t>Bilan relationnel</a:t>
+            </a:r>
+          </a:p>
+          <a:p>
+            <a:pPr lvl="1">
+              <a:buFont typeface="Arial" pitchFamily="34" charset="0"/>
+              <a:buChar char="•"/>
+            </a:pPr>
             <a:r>
               <a:rPr lang="fr-FR" dirty="0" smtClean="0"/>
-              <a:t>Analyser</a:t>
-            </a:r>
-          </a:p>
-          <a:p>
-            <a:endParaRPr lang="fr-FR" dirty="0" smtClean="0"/>
-          </a:p>
-          <a:p>
-            <a:r>
-              <a:rPr lang="fr-FR" dirty="0" smtClean="0"/>
-              <a:t>Déduire</a:t>
-            </a:r>
-            <a:endParaRPr lang="fr-FR" dirty="0"/>
+              <a:t>Prise de décision, responsabilité</a:t>
+            </a:r>
           </a:p>
         </p:txBody>
       </p:sp>
@@ -6278,32 +6299,6 @@
           </a:p>
         </p:txBody>
       </p:sp>
-      <p:pic>
-        <p:nvPicPr>
-          <p:cNvPr id="9218" name="Picture 2" descr="http://www.roues-ages-trans-missions.sitew.fr/fs/ROUES_AGES/normal/79up2-fotolia_15998379_xs.jpg"/>
-          <p:cNvPicPr>
-            <a:picLocks noChangeAspect="1" noChangeArrowheads="1"/>
-          </p:cNvPicPr>
-          <p:nvPr/>
-        </p:nvPicPr>
-        <p:blipFill>
-          <a:blip r:embed="rId2" cstate="print"/>
-          <a:srcRect/>
-          <a:stretch>
-            <a:fillRect/>
-          </a:stretch>
-        </p:blipFill>
-        <p:spPr bwMode="auto">
-          <a:xfrm>
-            <a:off x="5004048" y="2132856"/>
-            <a:ext cx="2857500" cy="2857500"/>
-          </a:xfrm>
-          <a:prstGeom prst="rect">
-            <a:avLst/>
-          </a:prstGeom>
-          <a:noFill/>
-        </p:spPr>
-      </p:pic>
     </p:spTree>
   </p:cSld>
   <p:clrMapOvr>
@@ -6348,15 +6343,81 @@
         </p:nvSpPr>
         <p:spPr/>
         <p:txBody>
-          <a:bodyPr/>
+          <a:bodyPr>
+            <a:normAutofit lnSpcReduction="10000"/>
+          </a:bodyPr>
           <a:lstStyle/>
           <a:p>
-            <a:pPr>
+            <a:r>
+              <a:rPr lang="fr-FR" dirty="0" smtClean="0"/>
+              <a:t>Étude des </a:t>
+            </a:r>
+            <a:r>
+              <a:rPr lang="fr-FR" i="1" dirty="0" smtClean="0"/>
+              <a:t>Daas</a:t>
+            </a:r>
+          </a:p>
+          <a:p>
+            <a:endParaRPr lang="fr-FR" dirty="0" smtClean="0"/>
+          </a:p>
+          <a:p>
+            <a:r>
+              <a:rPr lang="fr-FR" dirty="0" smtClean="0"/>
+              <a:t>Nouvel outil modulaire </a:t>
+            </a:r>
+            <a:br>
+              <a:rPr lang="fr-FR" dirty="0" smtClean="0"/>
+            </a:br>
+            <a:r>
+              <a:rPr lang="fr-FR" dirty="0" smtClean="0"/>
+              <a:t>d’évaluation des </a:t>
+            </a:r>
+            <a:r>
+              <a:rPr lang="fr-FR" i="1" dirty="0" smtClean="0"/>
+              <a:t>Daas</a:t>
+            </a:r>
+          </a:p>
+          <a:p>
+            <a:pPr lvl="1">
+              <a:buFont typeface="Arial" pitchFamily="34" charset="0"/>
+              <a:buChar char="•"/>
+            </a:pPr>
+            <a:r>
+              <a:rPr lang="fr-FR" dirty="0" smtClean="0">
+                <a:hlinkClick r:id="rId2"/>
+              </a:rPr>
+              <a:t>https://github.com/hyptos/kyd</a:t>
+            </a:r>
+            <a:endParaRPr lang="fr-FR" dirty="0" smtClean="0"/>
+          </a:p>
+          <a:p>
+            <a:pPr lvl="1">
               <a:buNone/>
             </a:pPr>
-            <a:r>
-              <a:rPr lang="fr-FR" b="1" dirty="0" smtClean="0"/>
-              <a:t>Bilan relationnel</a:t>
+            <a:endParaRPr lang="fr-FR" dirty="0" smtClean="0"/>
+          </a:p>
+          <a:p>
+            <a:r>
+              <a:rPr lang="fr-FR" dirty="0" smtClean="0"/>
+              <a:t>Expérimentations et analyses</a:t>
+            </a:r>
+          </a:p>
+          <a:p>
+            <a:endParaRPr lang="fr-FR" dirty="0" smtClean="0"/>
+          </a:p>
+          <a:p>
+            <a:r>
+              <a:rPr lang="fr-FR" dirty="0" smtClean="0"/>
+              <a:t>Pérennisation du logiciel</a:t>
+            </a:r>
+          </a:p>
+          <a:p>
+            <a:endParaRPr lang="fr-FR" dirty="0" smtClean="0"/>
+          </a:p>
+          <a:p>
+            <a:r>
+              <a:rPr lang="fr-FR" dirty="0" smtClean="0"/>
+              <a:t>Bonne expérience</a:t>
             </a:r>
           </a:p>
           <a:p>
@@ -6366,28 +6427,9 @@
             <a:endParaRPr lang="fr-FR" dirty="0" smtClean="0"/>
           </a:p>
           <a:p>
-            <a:r>
-              <a:rPr lang="fr-FR" dirty="0" smtClean="0"/>
-              <a:t>Autonomie</a:t>
-            </a:r>
-          </a:p>
-          <a:p>
-            <a:endParaRPr lang="fr-FR" dirty="0" smtClean="0"/>
-          </a:p>
-          <a:p>
-            <a:r>
-              <a:rPr lang="fr-FR" dirty="0" smtClean="0"/>
-              <a:t>Prise de décision</a:t>
-            </a:r>
-          </a:p>
-          <a:p>
-            <a:endParaRPr lang="fr-FR" dirty="0" smtClean="0"/>
-          </a:p>
-          <a:p>
-            <a:r>
-              <a:rPr lang="fr-FR" dirty="0" smtClean="0"/>
-              <a:t>Responsabilité</a:t>
-            </a:r>
+            <a:pPr>
+              <a:buNone/>
+            </a:pPr>
             <a:endParaRPr lang="fr-FR" dirty="0"/>
           </a:p>
         </p:txBody>
@@ -6409,7 +6451,7 @@
           <a:p>
             <a:r>
               <a:rPr lang="fr-FR" dirty="0" smtClean="0"/>
-              <a:t>Bilan</a:t>
+              <a:t>Conclusion</a:t>
             </a:r>
             <a:endParaRPr lang="fr-FR" dirty="0"/>
           </a:p>
@@ -6427,8 +6469,8 @@
         </p:nvSpPr>
         <p:spPr>
           <a:xfrm>
-            <a:off x="8460432" y="6407944"/>
-            <a:ext cx="552600" cy="365125"/>
+            <a:off x="8532440" y="6407944"/>
+            <a:ext cx="480592" cy="365125"/>
           </a:xfrm>
         </p:spPr>
         <p:txBody>
@@ -6440,36 +6482,10 @@
               <a:pPr/>
               <a:t>13</a:t>
             </a:fld>
-            <a:endParaRPr lang="fr-FR" sz="1600" dirty="0"/>
-          </a:p>
-        </p:txBody>
-      </p:sp>
-      <p:pic>
-        <p:nvPicPr>
-          <p:cNvPr id="6146" name="Picture 2" descr="http://www.etgfc.com/wp-content/uploads/2010/10/bonhomme-blanc.png"/>
-          <p:cNvPicPr>
-            <a:picLocks noChangeAspect="1" noChangeArrowheads="1"/>
-          </p:cNvPicPr>
-          <p:nvPr/>
-        </p:nvPicPr>
-        <p:blipFill>
-          <a:blip r:embed="rId2" cstate="print"/>
-          <a:srcRect/>
-          <a:stretch>
-            <a:fillRect/>
-          </a:stretch>
-        </p:blipFill>
-        <p:spPr bwMode="auto">
-          <a:xfrm>
-            <a:off x="5724128" y="2204864"/>
-            <a:ext cx="2381250" cy="2381250"/>
-          </a:xfrm>
-          <a:prstGeom prst="rect">
-            <a:avLst/>
-          </a:prstGeom>
-          <a:noFill/>
-        </p:spPr>
-      </p:pic>
+            <a:endParaRPr lang="fr-FR" sz="1600"/>
+          </a:p>
+        </p:txBody>
+      </p:sp>
     </p:spTree>
   </p:cSld>
   <p:clrMapOvr>
@@ -6517,50 +6533,31 @@
           <a:bodyPr/>
           <a:lstStyle/>
           <a:p>
+            <a:r>
+              <a:rPr lang="fr-FR" dirty="0" smtClean="0"/>
+              <a:t>Merci à Eddy Caron et Yves Caniou pour leur soutien</a:t>
+            </a:r>
+          </a:p>
+          <a:p>
             <a:endParaRPr lang="fr-FR" dirty="0" smtClean="0"/>
           </a:p>
           <a:p>
-            <a:endParaRPr lang="fr-FR" dirty="0" smtClean="0"/>
-          </a:p>
-          <a:p>
             <a:r>
               <a:rPr lang="fr-FR" dirty="0" smtClean="0"/>
-              <a:t>Bonne expérience</a:t>
-            </a:r>
-          </a:p>
-          <a:p>
-            <a:endParaRPr lang="fr-FR" dirty="0" smtClean="0"/>
-          </a:p>
-          <a:p>
-            <a:endParaRPr lang="fr-FR" dirty="0" smtClean="0"/>
-          </a:p>
-          <a:p>
-            <a:r>
-              <a:rPr lang="fr-FR" dirty="0" smtClean="0"/>
-              <a:t>Préférence du milieu </a:t>
-            </a:r>
-            <a:r>
-              <a:rPr lang="fr-FR" dirty="0" smtClean="0"/>
-              <a:t>professionnel</a:t>
-            </a:r>
-          </a:p>
-          <a:p>
-            <a:endParaRPr lang="fr-FR" dirty="0" smtClean="0"/>
-          </a:p>
-          <a:p>
-            <a:endParaRPr lang="fr-FR" dirty="0" smtClean="0"/>
-          </a:p>
-          <a:p>
-            <a:r>
-              <a:rPr lang="fr-FR" dirty="0" smtClean="0"/>
-              <a:t>https://github.com/hyptos/kyd</a:t>
-            </a:r>
-            <a:endParaRPr lang="fr-FR" dirty="0" smtClean="0"/>
+              <a:t>Merci à Laurent Pouilloux pour sa formation Execo</a:t>
+            </a:r>
           </a:p>
           <a:p>
             <a:pPr>
               <a:buNone/>
             </a:pPr>
+            <a:endParaRPr lang="fr-FR" dirty="0" smtClean="0"/>
+          </a:p>
+          <a:p>
+            <a:r>
+              <a:rPr lang="fr-FR" dirty="0" smtClean="0"/>
+              <a:t>Des questions ?</a:t>
+            </a:r>
             <a:endParaRPr lang="fr-FR" dirty="0"/>
           </a:p>
         </p:txBody>
@@ -6582,7 +6579,7 @@
           <a:p>
             <a:r>
               <a:rPr lang="fr-FR" dirty="0" smtClean="0"/>
-              <a:t>Conclusion</a:t>
+              <a:t>Merci</a:t>
             </a:r>
             <a:endParaRPr lang="fr-FR" dirty="0"/>
           </a:p>
@@ -6612,381 +6609,6 @@
               <a:rPr lang="fr-FR" sz="1600" smtClean="0"/>
               <a:pPr/>
               <a:t>14</a:t>
-            </a:fld>
-            <a:endParaRPr lang="fr-FR" sz="1600"/>
-          </a:p>
-        </p:txBody>
-      </p:sp>
-      <p:pic>
-        <p:nvPicPr>
-          <p:cNvPr id="5122" name="Picture 2" descr="http://blog.valoxy.org/wp-content/uploads/2013/05/%C3%A9capitaux-propres-300x198.png"/>
-          <p:cNvPicPr>
-            <a:picLocks noChangeAspect="1" noChangeArrowheads="1"/>
-          </p:cNvPicPr>
-          <p:nvPr/>
-        </p:nvPicPr>
-        <p:blipFill>
-          <a:blip r:embed="rId2" cstate="print"/>
-          <a:srcRect/>
-          <a:stretch>
-            <a:fillRect/>
-          </a:stretch>
-        </p:blipFill>
-        <p:spPr bwMode="auto">
-          <a:xfrm>
-            <a:off x="5004048" y="1268760"/>
-            <a:ext cx="3384376" cy="2233688"/>
-          </a:xfrm>
-          <a:prstGeom prst="rect">
-            <a:avLst/>
-          </a:prstGeom>
-          <a:noFill/>
-        </p:spPr>
-      </p:pic>
-    </p:spTree>
-  </p:cSld>
-  <p:clrMapOvr>
-    <a:masterClrMapping/>
-  </p:clrMapOvr>
-  <p:timing>
-    <p:tnLst>
-      <p:par>
-        <p:cTn id="1" dur="indefinite" restart="never" nodeType="tmRoot"/>
-      </p:par>
-    </p:tnLst>
-  </p:timing>
-</p:sld>
-</file>
-
-<file path=ppt/slides/slide15.xml><?xml version="1.0" encoding="utf-8"?>
-<p:sld xmlns:a="http://schemas.openxmlformats.org/drawingml/2006/main" xmlns:r="http://schemas.openxmlformats.org/officeDocument/2006/relationships" xmlns:p="http://schemas.openxmlformats.org/presentationml/2006/main">
-  <p:cSld>
-    <p:spTree>
-      <p:nvGrpSpPr>
-        <p:cNvPr id="1" name=""/>
-        <p:cNvGrpSpPr/>
-        <p:nvPr/>
-      </p:nvGrpSpPr>
-      <p:grpSpPr>
-        <a:xfrm>
-          <a:off x="0" y="0"/>
-          <a:ext cx="0" cy="0"/>
-          <a:chOff x="0" y="0"/>
-          <a:chExt cx="0" cy="0"/>
-        </a:xfrm>
-      </p:grpSpPr>
-      <p:sp>
-        <p:nvSpPr>
-          <p:cNvPr id="3" name="Titre 2"/>
-          <p:cNvSpPr>
-            <a:spLocks noGrp="1"/>
-          </p:cNvSpPr>
-          <p:nvPr>
-            <p:ph type="title"/>
-          </p:nvPr>
-        </p:nvSpPr>
-        <p:spPr/>
-        <p:txBody>
-          <a:bodyPr/>
-          <a:lstStyle/>
-          <a:p>
-            <a:r>
-              <a:rPr lang="fr-FR" dirty="0" smtClean="0"/>
-              <a:t>Démonstration</a:t>
-            </a:r>
-            <a:endParaRPr lang="fr-FR" dirty="0"/>
-          </a:p>
-        </p:txBody>
-      </p:sp>
-      <p:sp>
-        <p:nvSpPr>
-          <p:cNvPr id="4" name="Espace réservé du numéro de diapositive 3"/>
-          <p:cNvSpPr>
-            <a:spLocks noGrp="1"/>
-          </p:cNvSpPr>
-          <p:nvPr>
-            <p:ph type="sldNum" sz="quarter" idx="12"/>
-          </p:nvPr>
-        </p:nvSpPr>
-        <p:spPr>
-          <a:xfrm>
-            <a:off x="8532440" y="6407944"/>
-            <a:ext cx="480592" cy="365125"/>
-          </a:xfrm>
-        </p:spPr>
-        <p:txBody>
-          <a:bodyPr/>
-          <a:lstStyle/>
-          <a:p>
-            <a:fld id="{BCF39854-5727-49C5-871A-2A9A28C6ADE3}" type="slidenum">
-              <a:rPr lang="fr-FR" sz="1600" smtClean="0"/>
-              <a:pPr/>
-              <a:t>15</a:t>
-            </a:fld>
-            <a:endParaRPr lang="fr-FR" sz="1600" dirty="0"/>
-          </a:p>
-        </p:txBody>
-      </p:sp>
-      <p:pic>
-        <p:nvPicPr>
-          <p:cNvPr id="5" name="TERPres.wmv">
-            <a:hlinkClick r:id="" action="ppaction://media"/>
-          </p:cNvPr>
-          <p:cNvPicPr>
-            <a:picLocks noRot="1" noChangeAspect="1"/>
-          </p:cNvPicPr>
-          <p:nvPr>
-            <a:videoFile r:link="rId1"/>
-          </p:nvPr>
-        </p:nvPicPr>
-        <p:blipFill>
-          <a:blip r:embed="rId3" cstate="print"/>
-          <a:stretch>
-            <a:fillRect/>
-          </a:stretch>
-        </p:blipFill>
-        <p:spPr>
-          <a:xfrm>
-            <a:off x="0" y="1124744"/>
-            <a:ext cx="9144000" cy="5133229"/>
-          </a:xfrm>
-          <a:prstGeom prst="rect">
-            <a:avLst/>
-          </a:prstGeom>
-        </p:spPr>
-      </p:pic>
-    </p:spTree>
-  </p:cSld>
-  <p:clrMapOvr>
-    <a:masterClrMapping/>
-  </p:clrMapOvr>
-  <p:timing>
-    <p:tnLst>
-      <p:par>
-        <p:cTn id="1" dur="indefinite" restart="never" nodeType="tmRoot">
-          <p:childTnLst>
-            <p:seq concurrent="1" nextAc="seek">
-              <p:cTn id="2" restart="whenNotActive" fill="hold" evtFilter="cancelBubble" nodeType="interactiveSeq">
-                <p:stCondLst>
-                  <p:cond evt="onClick" delay="0">
-                    <p:tgtEl>
-                      <p:spTgt spid="5"/>
-                    </p:tgtEl>
-                  </p:cond>
-                </p:stCondLst>
-                <p:endSync evt="end" delay="0">
-                  <p:rtn val="all"/>
-                </p:endSync>
-                <p:childTnLst>
-                  <p:par>
-                    <p:cTn id="3" fill="hold">
-                      <p:stCondLst>
-                        <p:cond delay="0"/>
-                      </p:stCondLst>
-                      <p:childTnLst>
-                        <p:par>
-                          <p:cTn id="4" fill="hold">
-                            <p:stCondLst>
-                              <p:cond delay="0"/>
-                            </p:stCondLst>
-                            <p:childTnLst>
-                              <p:par>
-                                <p:cTn id="5" presetID="2" presetClass="mediacall" presetSubtype="0" fill="hold" nodeType="clickEffect">
-                                  <p:stCondLst>
-                                    <p:cond delay="0"/>
-                                  </p:stCondLst>
-                                  <p:childTnLst>
-                                    <p:cmd type="call" cmd="togglePause">
-                                      <p:cBhvr>
-                                        <p:cTn id="6" dur="1" fill="hold"/>
-                                        <p:tgtEl>
-                                          <p:spTgt spid="5"/>
-                                        </p:tgtEl>
-                                      </p:cBhvr>
-                                    </p:cmd>
-                                  </p:childTnLst>
-                                </p:cTn>
-                              </p:par>
-                            </p:childTnLst>
-                          </p:cTn>
-                        </p:par>
-                      </p:childTnLst>
-                    </p:cTn>
-                  </p:par>
-                </p:childTnLst>
-              </p:cTn>
-              <p:nextCondLst>
-                <p:cond evt="onClick" delay="0">
-                  <p:tgtEl>
-                    <p:spTgt spid="5"/>
-                  </p:tgtEl>
-                </p:cond>
-              </p:nextCondLst>
-            </p:seq>
-            <p:video>
-              <p:cMediaNode>
-                <p:cTn id="7" fill="hold" display="0">
-                  <p:stCondLst>
-                    <p:cond delay="indefinite"/>
-                  </p:stCondLst>
-                  <p:endCondLst>
-                    <p:cond evt="onNext" delay="0">
-                      <p:tgtEl>
-                        <p:sldTgt/>
-                      </p:tgtEl>
-                    </p:cond>
-                    <p:cond evt="onPrev" delay="0">
-                      <p:tgtEl>
-                        <p:sldTgt/>
-                      </p:tgtEl>
-                    </p:cond>
-                  </p:endCondLst>
-                </p:cTn>
-                <p:tgtEl>
-                  <p:spTgt spid="5"/>
-                </p:tgtEl>
-              </p:cMediaNode>
-            </p:video>
-          </p:childTnLst>
-        </p:cTn>
-      </p:par>
-    </p:tnLst>
-  </p:timing>
-</p:sld>
-</file>
-
-<file path=ppt/slides/slide16.xml><?xml version="1.0" encoding="utf-8"?>
-<p:sld xmlns:a="http://schemas.openxmlformats.org/drawingml/2006/main" xmlns:r="http://schemas.openxmlformats.org/officeDocument/2006/relationships" xmlns:p="http://schemas.openxmlformats.org/presentationml/2006/main">
-  <p:cSld>
-    <p:spTree>
-      <p:nvGrpSpPr>
-        <p:cNvPr id="1" name=""/>
-        <p:cNvGrpSpPr/>
-        <p:nvPr/>
-      </p:nvGrpSpPr>
-      <p:grpSpPr>
-        <a:xfrm>
-          <a:off x="0" y="0"/>
-          <a:ext cx="0" cy="0"/>
-          <a:chOff x="0" y="0"/>
-          <a:chExt cx="0" cy="0"/>
-        </a:xfrm>
-      </p:grpSpPr>
-      <p:sp>
-        <p:nvSpPr>
-          <p:cNvPr id="2" name="Espace réservé du contenu 1"/>
-          <p:cNvSpPr>
-            <a:spLocks noGrp="1"/>
-          </p:cNvSpPr>
-          <p:nvPr>
-            <p:ph idx="1"/>
-          </p:nvPr>
-        </p:nvSpPr>
-        <p:spPr/>
-        <p:txBody>
-          <a:bodyPr/>
-          <a:lstStyle/>
-          <a:p>
-            <a:endParaRPr lang="fr-FR" dirty="0" smtClean="0"/>
-          </a:p>
-          <a:p>
-            <a:r>
-              <a:rPr lang="fr-FR" dirty="0" smtClean="0"/>
-              <a:t>Merci à Eddy Caron Et Yves </a:t>
-            </a:r>
-            <a:r>
-              <a:rPr lang="fr-FR" dirty="0" err="1" smtClean="0"/>
-              <a:t>Caniou</a:t>
-            </a:r>
-            <a:r>
-              <a:rPr lang="fr-FR" dirty="0" smtClean="0"/>
-              <a:t> pour leur soutien</a:t>
-            </a:r>
-          </a:p>
-          <a:p>
-            <a:endParaRPr lang="fr-FR" dirty="0" smtClean="0"/>
-          </a:p>
-          <a:p>
-            <a:r>
-              <a:rPr lang="fr-FR" dirty="0" smtClean="0"/>
-              <a:t>Merci à Laurent </a:t>
-            </a:r>
-            <a:r>
-              <a:rPr lang="fr-FR" dirty="0" err="1" smtClean="0"/>
-              <a:t>Pouilloux</a:t>
-            </a:r>
-            <a:r>
-              <a:rPr lang="fr-FR" dirty="0" smtClean="0"/>
-              <a:t> pour sa formation </a:t>
-            </a:r>
-            <a:r>
-              <a:rPr lang="fr-FR" dirty="0" err="1" smtClean="0"/>
-              <a:t>Execo</a:t>
-            </a:r>
-            <a:endParaRPr lang="fr-FR" dirty="0" smtClean="0"/>
-          </a:p>
-          <a:p>
-            <a:pPr>
-              <a:buNone/>
-            </a:pPr>
-            <a:endParaRPr lang="fr-FR" dirty="0" smtClean="0"/>
-          </a:p>
-          <a:p>
-            <a:r>
-              <a:rPr lang="fr-FR" dirty="0" smtClean="0"/>
-              <a:t>Des questions ?</a:t>
-            </a:r>
-            <a:endParaRPr lang="fr-FR" dirty="0"/>
-          </a:p>
-        </p:txBody>
-      </p:sp>
-      <p:sp>
-        <p:nvSpPr>
-          <p:cNvPr id="3" name="Titre 2"/>
-          <p:cNvSpPr>
-            <a:spLocks noGrp="1"/>
-          </p:cNvSpPr>
-          <p:nvPr>
-            <p:ph type="title"/>
-          </p:nvPr>
-        </p:nvSpPr>
-        <p:spPr/>
-        <p:txBody>
-          <a:bodyPr/>
-          <a:lstStyle/>
-          <a:p>
-            <a:r>
-              <a:rPr lang="fr-FR" dirty="0" smtClean="0"/>
-              <a:t>Merci</a:t>
-            </a:r>
-            <a:endParaRPr lang="fr-FR" dirty="0"/>
-          </a:p>
-        </p:txBody>
-      </p:sp>
-      <p:sp>
-        <p:nvSpPr>
-          <p:cNvPr id="4" name="Espace réservé du numéro de diapositive 3"/>
-          <p:cNvSpPr>
-            <a:spLocks noGrp="1"/>
-          </p:cNvSpPr>
-          <p:nvPr>
-            <p:ph type="sldNum" sz="quarter" idx="12"/>
-          </p:nvPr>
-        </p:nvSpPr>
-        <p:spPr>
-          <a:xfrm>
-            <a:off x="8532440" y="6407944"/>
-            <a:ext cx="480592" cy="365125"/>
-          </a:xfrm>
-        </p:spPr>
-        <p:txBody>
-          <a:bodyPr/>
-          <a:lstStyle/>
-          <a:p>
-            <a:fld id="{BCF39854-5727-49C5-871A-2A9A28C6ADE3}" type="slidenum">
-              <a:rPr lang="fr-FR" sz="1600" smtClean="0"/>
-              <a:pPr/>
-              <a:t>16</a:t>
             </a:fld>
             <a:endParaRPr lang="fr-FR" sz="1600"/>
           </a:p>
@@ -7126,7 +6748,7 @@
           <a:p>
             <a:r>
               <a:rPr lang="fr-FR" dirty="0" smtClean="0"/>
-              <a:t>Recherche</a:t>
+              <a:t>Environnement et état de l’art</a:t>
             </a:r>
             <a:endParaRPr lang="fr-FR" dirty="0" smtClean="0"/>
           </a:p>
@@ -7136,15 +6758,7 @@
           <a:p>
             <a:r>
               <a:rPr lang="fr-FR" dirty="0" smtClean="0"/>
-              <a:t>Know </a:t>
-            </a:r>
-            <a:r>
-              <a:rPr lang="fr-FR" dirty="0" err="1" smtClean="0"/>
-              <a:t>Your</a:t>
-            </a:r>
-            <a:r>
-              <a:rPr lang="fr-FR" dirty="0" smtClean="0"/>
-              <a:t> Data</a:t>
+              <a:t>Know Your Data</a:t>
             </a:r>
           </a:p>
           <a:p>
@@ -7162,8 +6776,9 @@
           <a:p>
             <a:r>
               <a:rPr lang="fr-FR" dirty="0" smtClean="0"/>
-              <a:t>Bilan</a:t>
-            </a:r>
+              <a:t>Bilans</a:t>
+            </a:r>
+            <a:endParaRPr lang="fr-FR" dirty="0" smtClean="0"/>
           </a:p>
           <a:p>
             <a:endParaRPr lang="fr-FR" dirty="0" smtClean="0"/>
@@ -7241,7 +6856,7 @@
         </p:blipFill>
         <p:spPr bwMode="auto">
           <a:xfrm>
-            <a:off x="4572000" y="2276872"/>
+            <a:off x="5220072" y="2924944"/>
             <a:ext cx="2736304" cy="2736304"/>
           </a:xfrm>
           <a:prstGeom prst="rect">
@@ -7305,19 +6920,9 @@
             </a:r>
           </a:p>
           <a:p>
-            <a:endParaRPr lang="fr-FR" dirty="0" smtClean="0"/>
-          </a:p>
-          <a:p>
-            <a:r>
-              <a:rPr lang="fr-FR" dirty="0" err="1" smtClean="0"/>
-              <a:t>Big</a:t>
-            </a:r>
-            <a:r>
-              <a:rPr lang="fr-FR" dirty="0" smtClean="0"/>
-              <a:t> Data</a:t>
-            </a:r>
-          </a:p>
-          <a:p>
+            <a:pPr>
+              <a:buNone/>
+            </a:pPr>
             <a:endParaRPr lang="fr-FR" dirty="0" smtClean="0"/>
           </a:p>
           <a:p>
@@ -7342,6 +6947,16 @@
             <a:r>
               <a:rPr lang="fr-FR" dirty="0" smtClean="0"/>
               <a:t>Aide à la décision</a:t>
+            </a:r>
+          </a:p>
+          <a:p>
+            <a:pPr lvl="1">
+              <a:buFont typeface="Arial" pitchFamily="34" charset="0"/>
+              <a:buChar char="•"/>
+            </a:pPr>
+            <a:r>
+              <a:rPr lang="fr-FR" dirty="0" smtClean="0"/>
+              <a:t>Big Data</a:t>
             </a:r>
           </a:p>
           <a:p>
@@ -7472,9 +7087,19 @@
             <a:pPr>
               <a:buNone/>
             </a:pPr>
+            <a:endParaRPr lang="fr-FR" b="1" dirty="0" smtClean="0"/>
+          </a:p>
+          <a:p>
+            <a:pPr>
+              <a:buNone/>
+            </a:pPr>
             <a:r>
               <a:rPr lang="fr-FR" b="1" dirty="0" smtClean="0"/>
-              <a:t>Solutions de stockage</a:t>
+              <a:t>Solutions </a:t>
+            </a:r>
+            <a:r>
+              <a:rPr lang="fr-FR" b="1" dirty="0" smtClean="0"/>
+              <a:t>de stockage</a:t>
             </a:r>
           </a:p>
           <a:p>
@@ -7486,7 +7111,7 @@
           <a:p>
             <a:r>
               <a:rPr lang="fr-FR" dirty="0" smtClean="0"/>
-              <a:t>Arguments : SDK, API, Popularité, limitations</a:t>
+              <a:t>Critères : SDK, API, limitations, popularité</a:t>
             </a:r>
           </a:p>
           <a:p>
@@ -7495,21 +7120,7 @@
           <a:p>
             <a:r>
               <a:rPr lang="fr-FR" dirty="0" smtClean="0"/>
-              <a:t>Localisation des </a:t>
-            </a:r>
-            <a:r>
-              <a:rPr lang="fr-FR" dirty="0" err="1" smtClean="0"/>
-              <a:t>datacenters</a:t>
-            </a:r>
-            <a:endParaRPr lang="fr-FR" dirty="0" smtClean="0"/>
-          </a:p>
-          <a:p>
-            <a:endParaRPr lang="fr-FR" dirty="0" smtClean="0"/>
-          </a:p>
-          <a:p>
-            <a:r>
-              <a:rPr lang="fr-FR" dirty="0" smtClean="0"/>
-              <a:t>Hébergeurs liés</a:t>
+              <a:t>Localisation des datacenters</a:t>
             </a:r>
           </a:p>
           <a:p>
@@ -7540,7 +7151,7 @@
           <a:p>
             <a:r>
               <a:rPr lang="fr-FR" dirty="0" smtClean="0"/>
-              <a:t>Recherche</a:t>
+              <a:t>Environnement</a:t>
             </a:r>
             <a:endParaRPr lang="fr-FR" dirty="0"/>
           </a:p>
@@ -7847,7 +7458,7 @@
         <p:spPr/>
         <p:txBody>
           <a:bodyPr>
-            <a:normAutofit fontScale="92500" lnSpcReduction="10000"/>
+            <a:normAutofit fontScale="85000" lnSpcReduction="20000"/>
           </a:bodyPr>
           <a:lstStyle/>
           <a:p>
@@ -7876,52 +7487,70 @@
           </a:p>
           <a:p>
             <a:r>
-              <a:rPr lang="fr-FR" dirty="0" err="1" smtClean="0"/>
+              <a:rPr lang="fr-FR" dirty="0" smtClean="0"/>
               <a:t>CosBench</a:t>
             </a:r>
+          </a:p>
+          <a:p>
             <a:endParaRPr lang="fr-FR" dirty="0" smtClean="0"/>
           </a:p>
           <a:p>
+            <a:r>
+              <a:rPr lang="fr-FR" dirty="0" smtClean="0"/>
+              <a:t>CloudScreener</a:t>
+            </a:r>
+          </a:p>
+          <a:p>
             <a:endParaRPr lang="fr-FR" dirty="0" smtClean="0"/>
           </a:p>
           <a:p>
             <a:r>
-              <a:rPr lang="fr-FR" dirty="0" err="1" smtClean="0"/>
-              <a:t>CloudScreener</a:t>
-            </a:r>
+              <a:rPr lang="fr-FR" dirty="0" smtClean="0"/>
+              <a:t>PerfKit</a:t>
+            </a:r>
+          </a:p>
+          <a:p>
             <a:endParaRPr lang="fr-FR" dirty="0" smtClean="0"/>
           </a:p>
           <a:p>
-            <a:endParaRPr lang="fr-FR" dirty="0" smtClean="0"/>
-          </a:p>
-          <a:p>
-            <a:r>
-              <a:rPr lang="fr-FR" dirty="0" err="1" smtClean="0"/>
-              <a:t>PerfKit</a:t>
-            </a:r>
-            <a:endParaRPr lang="fr-FR" dirty="0" smtClean="0"/>
-          </a:p>
-          <a:p>
-            <a:endParaRPr lang="fr-FR" dirty="0" smtClean="0"/>
-          </a:p>
-          <a:p>
             <a:r>
               <a:rPr lang="fr-FR" dirty="0" smtClean="0"/>
-              <a:t>Projet </a:t>
-            </a:r>
-            <a:r>
-              <a:rPr lang="fr-FR" dirty="0" err="1" smtClean="0"/>
-              <a:t>Idilio</a:t>
-            </a:r>
+              <a:t>Travaux de recherche</a:t>
+            </a:r>
+          </a:p>
+          <a:p>
+            <a:pPr>
+              <a:buNone/>
+            </a:pPr>
             <a:r>
               <a:rPr lang="fr-FR" dirty="0" smtClean="0"/>
+              <a:t>   I.Drago </a:t>
+            </a:r>
+            <a:r>
+              <a:rPr lang="fr-FR" i="1" dirty="0" smtClean="0"/>
+              <a:t>et al</a:t>
+            </a:r>
+            <a:r>
+              <a:rPr lang="fr-FR" i="1" dirty="0" smtClean="0"/>
+              <a:t>.</a:t>
+            </a:r>
+          </a:p>
+          <a:p>
+            <a:pPr lvl="1">
+              <a:buFont typeface="Arial" pitchFamily="34" charset="0"/>
+              <a:buChar char="•"/>
+            </a:pPr>
+            <a:r>
+              <a:rPr lang="fr-FR" i="1" dirty="0" smtClean="0"/>
               <a:t> </a:t>
             </a:r>
             <a:r>
-              <a:rPr lang="fr-FR" dirty="0" err="1" smtClean="0"/>
-              <a:t>Drago</a:t>
-            </a:r>
-            <a:endParaRPr lang="fr-FR" dirty="0" smtClean="0"/>
+              <a:rPr lang="fr-FR" sz="1400" i="1" dirty="0" smtClean="0">
+                <a:hlinkClick r:id="rId2"/>
+              </a:rPr>
+              <a:t>URL</a:t>
+            </a:r>
+            <a:endParaRPr lang="fr-FR" sz="1400" i="1" dirty="0" smtClean="0"/>
           </a:p>
         </p:txBody>
       </p:sp>
@@ -7942,7 +7571,7 @@
           <a:p>
             <a:r>
               <a:rPr lang="fr-FR" dirty="0" smtClean="0"/>
-              <a:t>Recherche</a:t>
+              <a:t>État de l’art</a:t>
             </a:r>
             <a:endParaRPr lang="fr-FR" dirty="0"/>
           </a:p>
@@ -7981,7 +7610,7 @@
           <p:nvPr/>
         </p:nvPicPr>
         <p:blipFill>
-          <a:blip r:embed="rId2" cstate="print"/>
+          <a:blip r:embed="rId3" cstate="print"/>
           <a:srcRect/>
           <a:stretch>
             <a:fillRect/>
@@ -8037,7 +7666,7 @@
           <p:nvPr/>
         </p:nvPicPr>
         <p:blipFill>
-          <a:blip r:embed="rId3" cstate="print"/>
+          <a:blip r:embed="rId4" cstate="print"/>
           <a:srcRect/>
           <a:stretch>
             <a:fillRect/>
@@ -8045,7 +7674,7 @@
         </p:blipFill>
         <p:spPr bwMode="auto">
           <a:xfrm>
-            <a:off x="4211960" y="3501008"/>
+            <a:off x="4247456" y="3501008"/>
             <a:ext cx="4896544" cy="2717583"/>
           </a:xfrm>
           <a:prstGeom prst="rect">
@@ -8077,7 +7706,7 @@
           <a:lstStyle/>
           <a:p>
             <a:r>
-              <a:rPr lang="fr-FR" sz="1200" dirty="0" err="1" smtClean="0"/>
+              <a:rPr lang="fr-FR" sz="1200" dirty="0" smtClean="0"/>
               <a:t>CloudScreener</a:t>
             </a:r>
             <a:endParaRPr lang="fr-FR" sz="1200" dirty="0"/>
@@ -8128,7 +7757,9 @@
         </p:nvSpPr>
         <p:spPr/>
         <p:txBody>
-          <a:bodyPr/>
+          <a:bodyPr>
+            <a:normAutofit/>
+          </a:bodyPr>
           <a:lstStyle/>
           <a:p>
             <a:pPr>
@@ -8149,13 +7780,36 @@
           <a:p>
             <a:r>
               <a:rPr lang="fr-FR" dirty="0" smtClean="0"/>
-              <a:t>Choix des paramètres</a:t>
-            </a:r>
-          </a:p>
-          <a:p>
+              <a:t>Choix des </a:t>
+            </a:r>
+            <a:r>
+              <a:rPr lang="fr-FR" dirty="0" smtClean="0"/>
+              <a:t>paramètres</a:t>
+            </a:r>
+          </a:p>
+          <a:p>
+            <a:pPr lvl="1">
+              <a:buFont typeface="Arial" pitchFamily="34" charset="0"/>
+              <a:buChar char="•"/>
+            </a:pPr>
+            <a:r>
+              <a:rPr lang="fr-FR" dirty="0" smtClean="0"/>
+              <a:t>Taille, localisation, protocole, </a:t>
+            </a:r>
+            <a:r>
+              <a:rPr lang="fr-FR" i="1" dirty="0" smtClean="0"/>
+              <a:t>etc</a:t>
+            </a:r>
+            <a:r>
+              <a:rPr lang="fr-FR" dirty="0" smtClean="0"/>
+              <a:t>.</a:t>
+            </a:r>
             <a:endParaRPr lang="fr-FR" dirty="0" smtClean="0"/>
           </a:p>
           <a:p>
+            <a:pPr>
+              <a:buNone/>
+            </a:pPr>
             <a:endParaRPr lang="fr-FR" dirty="0" smtClean="0"/>
           </a:p>
           <a:p>
@@ -8167,8 +7821,6 @@
               <a:rPr lang="fr-FR" dirty="0" smtClean="0"/>
               <a:t>données</a:t>
             </a:r>
-          </a:p>
-          <a:p>
             <a:endParaRPr lang="fr-FR" dirty="0" smtClean="0"/>
           </a:p>
           <a:p>
@@ -8177,7 +7829,21 @@
           <a:p>
             <a:r>
               <a:rPr lang="fr-FR" dirty="0" smtClean="0"/>
-              <a:t>Protocole expérimental</a:t>
+              <a:t>Protocole </a:t>
+            </a:r>
+            <a:r>
+              <a:rPr lang="fr-FR" dirty="0" smtClean="0"/>
+              <a:t>expérimental</a:t>
+            </a:r>
+          </a:p>
+          <a:p>
+            <a:pPr lvl="1">
+              <a:buFont typeface="Arial" pitchFamily="34" charset="0"/>
+              <a:buChar char="•"/>
+            </a:pPr>
+            <a:r>
+              <a:rPr lang="fr-FR" dirty="0" smtClean="0"/>
+              <a:t>Tests de paramètres</a:t>
             </a:r>
             <a:endParaRPr lang="fr-FR" dirty="0" smtClean="0"/>
           </a:p>
@@ -8205,15 +7871,7 @@
           <a:p>
             <a:r>
               <a:rPr lang="fr-FR" dirty="0" smtClean="0"/>
-              <a:t>Know </a:t>
-            </a:r>
-            <a:r>
-              <a:rPr lang="fr-FR" dirty="0" err="1" smtClean="0"/>
-              <a:t>Your</a:t>
-            </a:r>
-            <a:r>
-              <a:rPr lang="fr-FR" dirty="0" smtClean="0"/>
-              <a:t> Data</a:t>
+              <a:t>Know Your Data</a:t>
             </a:r>
             <a:endParaRPr lang="fr-FR" dirty="0"/>
           </a:p>
@@ -8243,38 +7901,6 @@
           </a:p>
         </p:txBody>
       </p:sp>
-      <p:pic>
-        <p:nvPicPr>
-          <p:cNvPr id="12291" name="Picture 3"/>
-          <p:cNvPicPr>
-            <a:picLocks noChangeAspect="1" noChangeArrowheads="1"/>
-          </p:cNvPicPr>
-          <p:nvPr/>
-        </p:nvPicPr>
-        <p:blipFill>
-          <a:blip r:embed="rId2" cstate="print"/>
-          <a:srcRect/>
-          <a:stretch>
-            <a:fillRect/>
-          </a:stretch>
-        </p:blipFill>
-        <p:spPr bwMode="auto">
-          <a:xfrm>
-            <a:off x="5724128" y="2060848"/>
-            <a:ext cx="2533650" cy="3333750"/>
-          </a:xfrm>
-          <a:prstGeom prst="rect">
-            <a:avLst/>
-          </a:prstGeom>
-          <a:noFill/>
-          <a:ln w="9525">
-            <a:noFill/>
-            <a:miter lim="800000"/>
-            <a:headEnd/>
-            <a:tailEnd/>
-          </a:ln>
-        </p:spPr>
-      </p:pic>
     </p:spTree>
   </p:cSld>
   <p:clrMapOvr>
@@ -8319,7 +7945,9 @@
         </p:nvSpPr>
         <p:spPr/>
         <p:txBody>
-          <a:bodyPr/>
+          <a:bodyPr>
+            <a:normAutofit lnSpcReduction="10000"/>
+          </a:bodyPr>
           <a:lstStyle/>
           <a:p>
             <a:pPr>
@@ -8339,11 +7967,45 @@
           <a:p>
             <a:r>
               <a:rPr lang="fr-FR" dirty="0" smtClean="0"/>
-              <a:t>Types de tests</a:t>
-            </a:r>
-          </a:p>
-          <a:p>
-            <a:pPr>
+              <a:t>Types de </a:t>
+            </a:r>
+            <a:r>
+              <a:rPr lang="fr-FR" dirty="0" smtClean="0"/>
+              <a:t>tests</a:t>
+            </a:r>
+          </a:p>
+          <a:p>
+            <a:pPr lvl="1">
+              <a:buFont typeface="Arial" pitchFamily="34" charset="0"/>
+              <a:buChar char="•"/>
+            </a:pPr>
+            <a:r>
+              <a:rPr lang="fr-FR" dirty="0" smtClean="0"/>
+              <a:t>Environ 10 000 tests</a:t>
+            </a:r>
+          </a:p>
+          <a:p>
+            <a:pPr lvl="1">
+              <a:buFont typeface="Arial" pitchFamily="34" charset="0"/>
+              <a:buChar char="•"/>
+            </a:pPr>
+            <a:r>
+              <a:rPr lang="fr-FR" dirty="0" smtClean="0"/>
+              <a:t>Moyenne de temps par taille de fichier</a:t>
+            </a:r>
+          </a:p>
+          <a:p>
+            <a:pPr lvl="1">
+              <a:buFont typeface="Arial" pitchFamily="34" charset="0"/>
+              <a:buChar char="•"/>
+            </a:pPr>
+            <a:r>
+              <a:rPr lang="fr-FR" dirty="0" smtClean="0"/>
+              <a:t>Moyenne de temps sur 24h</a:t>
+            </a:r>
+          </a:p>
+          <a:p>
+            <a:pPr lvl="1">
               <a:buNone/>
             </a:pPr>
             <a:endParaRPr lang="fr-FR" dirty="0" smtClean="0"/>
@@ -8355,23 +8017,30 @@
             </a:r>
           </a:p>
           <a:p>
-            <a:pPr lvl="1"/>
-            <a:r>
-              <a:rPr lang="fr-FR" dirty="0" err="1" smtClean="0"/>
-              <a:t>Execo</a:t>
-            </a:r>
+            <a:pPr lvl="1">
+              <a:buFont typeface="Arial" pitchFamily="34" charset="0"/>
+              <a:buChar char="•"/>
+            </a:pPr>
             <a:r>
               <a:rPr lang="fr-FR" dirty="0" smtClean="0"/>
-              <a:t> </a:t>
-            </a:r>
-            <a:r>
-              <a:rPr lang="fr-FR" dirty="0" err="1" smtClean="0"/>
-              <a:t>Engine</a:t>
-            </a:r>
-            <a:endParaRPr lang="fr-FR" dirty="0" smtClean="0"/>
-          </a:p>
-          <a:p>
-            <a:pPr lvl="1"/>
+              <a:t>Python</a:t>
+            </a:r>
+          </a:p>
+          <a:p>
+            <a:pPr lvl="1">
+              <a:buFont typeface="Arial" pitchFamily="34" charset="0"/>
+              <a:buChar char="•"/>
+            </a:pPr>
+            <a:r>
+              <a:rPr lang="fr-FR" dirty="0" smtClean="0"/>
+              <a:t>Execo Engine</a:t>
+            </a:r>
+          </a:p>
+          <a:p>
+            <a:pPr lvl="1">
+              <a:buFont typeface="Arial" pitchFamily="34" charset="0"/>
+              <a:buChar char="•"/>
+            </a:pPr>
             <a:r>
               <a:rPr lang="fr-FR" dirty="0" smtClean="0"/>
               <a:t>MongoDB</a:t>
@@ -8404,15 +8073,7 @@
           <a:p>
             <a:r>
               <a:rPr lang="fr-FR" dirty="0" smtClean="0"/>
-              <a:t>Know </a:t>
-            </a:r>
-            <a:r>
-              <a:rPr lang="fr-FR" dirty="0" err="1" smtClean="0"/>
-              <a:t>Your</a:t>
-            </a:r>
-            <a:r>
-              <a:rPr lang="fr-FR" dirty="0" smtClean="0"/>
-              <a:t> Data</a:t>
+              <a:t>Know Your Data</a:t>
             </a:r>
             <a:endParaRPr lang="fr-FR" dirty="0"/>
           </a:p>
@@ -8442,32 +8103,6 @@
           </a:p>
         </p:txBody>
       </p:sp>
-      <p:pic>
-        <p:nvPicPr>
-          <p:cNvPr id="11266" name="Picture 2" descr="http://www.clg-fraissinet.ac-aix-marseille.fr/spip/local/cache-vignettes/L148xH309/chantier_bonhomme-0251e.gif"/>
-          <p:cNvPicPr>
-            <a:picLocks noChangeAspect="1" noChangeArrowheads="1"/>
-          </p:cNvPicPr>
-          <p:nvPr/>
-        </p:nvPicPr>
-        <p:blipFill>
-          <a:blip r:embed="rId2" cstate="print"/>
-          <a:srcRect/>
-          <a:stretch>
-            <a:fillRect/>
-          </a:stretch>
-        </p:blipFill>
-        <p:spPr bwMode="auto">
-          <a:xfrm>
-            <a:off x="6444208" y="2348880"/>
-            <a:ext cx="1271743" cy="2655193"/>
-          </a:xfrm>
-          <a:prstGeom prst="rect">
-            <a:avLst/>
-          </a:prstGeom>
-          <a:noFill/>
-        </p:spPr>
-      </p:pic>
     </p:spTree>
   </p:cSld>
   <p:clrMapOvr>
@@ -8532,22 +8167,42 @@
           <a:p>
             <a:r>
               <a:rPr lang="fr-FR" dirty="0" smtClean="0"/>
-              <a:t>Modulaire</a:t>
-            </a:r>
-          </a:p>
-          <a:p>
-            <a:pPr>
-              <a:buNone/>
+              <a:t>Modularité</a:t>
+            </a:r>
+          </a:p>
+          <a:p>
+            <a:pPr lvl="1">
+              <a:buFont typeface="Arial" pitchFamily="34" charset="0"/>
+              <a:buChar char="•"/>
             </a:pPr>
-            <a:endParaRPr lang="fr-FR" dirty="0" smtClean="0"/>
-          </a:p>
-          <a:p>
             <a:r>
               <a:rPr lang="fr-FR" dirty="0" smtClean="0"/>
-              <a:t>Python</a:t>
-            </a:r>
-          </a:p>
-          <a:p>
+              <a:t>Nouveaux </a:t>
+            </a:r>
+            <a:r>
+              <a:rPr lang="fr-FR" i="1" dirty="0" smtClean="0"/>
+              <a:t>Daas</a:t>
+            </a:r>
+          </a:p>
+          <a:p>
+            <a:pPr lvl="1">
+              <a:buFont typeface="Arial" pitchFamily="34" charset="0"/>
+              <a:buChar char="•"/>
+            </a:pPr>
+            <a:r>
+              <a:rPr lang="fr-FR" dirty="0" smtClean="0"/>
+              <a:t>Nouveaux protocoles </a:t>
+            </a:r>
+            <a:br>
+              <a:rPr lang="fr-FR" dirty="0" smtClean="0"/>
+            </a:br>
+            <a:r>
+              <a:rPr lang="fr-FR" dirty="0" smtClean="0"/>
+              <a:t>expérimentaux</a:t>
+            </a:r>
+          </a:p>
+          <a:p>
+            <a:pPr lvl="1"/>
             <a:endParaRPr lang="fr-FR" dirty="0" smtClean="0"/>
           </a:p>
           <a:p>
@@ -8589,15 +8244,7 @@
           <a:p>
             <a:r>
               <a:rPr lang="fr-FR" dirty="0" smtClean="0"/>
-              <a:t>Know </a:t>
-            </a:r>
-            <a:r>
-              <a:rPr lang="fr-FR" dirty="0" err="1" smtClean="0"/>
-              <a:t>Your</a:t>
-            </a:r>
-            <a:r>
-              <a:rPr lang="fr-FR" dirty="0" smtClean="0"/>
-              <a:t> Data</a:t>
+              <a:t>Know Your Data</a:t>
             </a:r>
             <a:endParaRPr lang="fr-FR" dirty="0"/>
           </a:p>
@@ -8775,7 +8422,7 @@
       </p:sp>
       <p:pic>
         <p:nvPicPr>
-          <p:cNvPr id="11" name="Picture 2"/>
+          <p:cNvPr id="2050" name="Picture 2"/>
           <p:cNvPicPr>
             <a:picLocks noChangeAspect="1" noChangeArrowheads="1"/>
           </p:cNvPicPr>
@@ -8790,8 +8437,8 @@
         </p:blipFill>
         <p:spPr bwMode="auto">
           <a:xfrm>
-            <a:off x="107504" y="2276871"/>
-            <a:ext cx="8897916" cy="3394787"/>
+            <a:off x="114300" y="2179290"/>
+            <a:ext cx="8915400" cy="3409950"/>
           </a:xfrm>
           <a:prstGeom prst="rect">
             <a:avLst/>

</xml_diff>